<commit_message>
Final version of the slides.
</commit_message>
<xml_diff>
--- a/docs/ODBC2KML Demo Slides.pptx
+++ b/docs/ODBC2KML Demo Slides.pptx
@@ -5,7 +5,7 @@
     <p:sldMasterId id="2147483744" r:id="rId1"/>
   </p:sldMasterIdLst>
   <p:notesMasterIdLst>
-    <p:notesMasterId r:id="rId24"/>
+    <p:notesMasterId r:id="rId26"/>
   </p:notesMasterIdLst>
   <p:sldIdLst>
     <p:sldId id="256" r:id="rId2"/>
@@ -15,21 +15,23 @@
     <p:sldId id="278" r:id="rId6"/>
     <p:sldId id="283" r:id="rId7"/>
     <p:sldId id="285" r:id="rId8"/>
-    <p:sldId id="284" r:id="rId9"/>
-    <p:sldId id="257" r:id="rId10"/>
-    <p:sldId id="286" r:id="rId11"/>
-    <p:sldId id="287" r:id="rId12"/>
-    <p:sldId id="269" r:id="rId13"/>
-    <p:sldId id="270" r:id="rId14"/>
-    <p:sldId id="271" r:id="rId15"/>
-    <p:sldId id="272" r:id="rId16"/>
-    <p:sldId id="273" r:id="rId17"/>
-    <p:sldId id="275" r:id="rId18"/>
-    <p:sldId id="274" r:id="rId19"/>
-    <p:sldId id="262" r:id="rId20"/>
-    <p:sldId id="267" r:id="rId21"/>
-    <p:sldId id="280" r:id="rId22"/>
-    <p:sldId id="281" r:id="rId23"/>
+    <p:sldId id="288" r:id="rId9"/>
+    <p:sldId id="284" r:id="rId10"/>
+    <p:sldId id="257" r:id="rId11"/>
+    <p:sldId id="286" r:id="rId12"/>
+    <p:sldId id="290" r:id="rId13"/>
+    <p:sldId id="287" r:id="rId14"/>
+    <p:sldId id="269" r:id="rId15"/>
+    <p:sldId id="270" r:id="rId16"/>
+    <p:sldId id="271" r:id="rId17"/>
+    <p:sldId id="272" r:id="rId18"/>
+    <p:sldId id="273" r:id="rId19"/>
+    <p:sldId id="275" r:id="rId20"/>
+    <p:sldId id="274" r:id="rId21"/>
+    <p:sldId id="267" r:id="rId22"/>
+    <p:sldId id="280" r:id="rId23"/>
+    <p:sldId id="289" r:id="rId24"/>
+    <p:sldId id="281" r:id="rId25"/>
   </p:sldIdLst>
   <p:sldSz cx="9144000" cy="6858000" type="screen4x3"/>
   <p:notesSz cx="6858000" cy="9144000"/>
@@ -264,24 +266,24 @@
           </c:val>
         </c:ser>
         <c:marker val="1"/>
-        <c:axId val="83531648"/>
-        <c:axId val="83542400"/>
+        <c:axId val="55109888"/>
+        <c:axId val="56337920"/>
       </c:lineChart>
       <c:catAx>
-        <c:axId val="83531648"/>
+        <c:axId val="55109888"/>
         <c:scaling>
           <c:orientation val="minMax"/>
         </c:scaling>
         <c:axPos val="b"/>
         <c:tickLblPos val="nextTo"/>
-        <c:crossAx val="83542400"/>
+        <c:crossAx val="56337920"/>
         <c:crosses val="autoZero"/>
         <c:auto val="1"/>
         <c:lblAlgn val="ctr"/>
         <c:lblOffset val="100"/>
       </c:catAx>
       <c:valAx>
-        <c:axId val="83542400"/>
+        <c:axId val="56337920"/>
         <c:scaling>
           <c:orientation val="minMax"/>
         </c:scaling>
@@ -289,7 +291,7 @@
         <c:majorGridlines/>
         <c:numFmt formatCode="General" sourceLinked="1"/>
         <c:tickLblPos val="nextTo"/>
-        <c:crossAx val="83531648"/>
+        <c:crossAx val="55109888"/>
         <c:crosses val="autoZero"/>
         <c:crossBetween val="between"/>
       </c:valAx>
@@ -398,7 +400,7 @@
             <a:fld id="{85A68EFB-1316-444C-A87F-A3B405362BF0}" type="datetimeFigureOut">
               <a:rPr lang="en-US" smtClean="0"/>
               <a:pPr/>
-              <a:t>4/12/2010</a:t>
+              <a:t>4/14/2010</a:t>
             </a:fld>
             <a:endParaRPr lang="en-US"/>
           </a:p>
@@ -569,7 +571,7 @@
     </p:spTree>
     <p:extLst>
       <p:ext uri="{BB962C8B-B14F-4D97-AF65-F5344CB8AC3E}">
-        <p14:creationId xmlns:p14="http://schemas.microsoft.com/office/powerpoint/2010/main" xmlns="" val="411620285"/>
+        <p14:creationId xmlns="" xmlns:p14="http://schemas.microsoft.com/office/powerpoint/2010/main" val="411620285"/>
       </p:ext>
     </p:extLst>
   </p:cSld>
@@ -708,14 +710,14 @@
           <a:noFill/>
           <a:extLst>
             <a:ext uri="{909E8E84-426E-40DD-AFC4-6F175D3DCCD1}">
-              <a14:hiddenFill xmlns:a14="http://schemas.microsoft.com/office/drawing/2010/main" xmlns="">
+              <a14:hiddenFill xmlns="" xmlns:a14="http://schemas.microsoft.com/office/drawing/2010/main">
                 <a:solidFill>
                   <a:srgbClr xmlns:mc="http://schemas.openxmlformats.org/markup-compatibility/2006" val="FFFFFF" mc:Ignorable=""/>
                 </a:solidFill>
               </a14:hiddenFill>
             </a:ext>
             <a:ext uri="{91240B29-F687-4F45-9708-019B960494DF}">
-              <a14:hiddenLine xmlns:a14="http://schemas.microsoft.com/office/drawing/2010/main" xmlns="" w="9525">
+              <a14:hiddenLine xmlns="" xmlns:a14="http://schemas.microsoft.com/office/drawing/2010/main" w="9525">
                 <a:solidFill>
                   <a:srgbClr xmlns:mc="http://schemas.openxmlformats.org/markup-compatibility/2006" val="000000" mc:Ignorable=""/>
                 </a:solidFill>
@@ -886,14 +888,14 @@
           <a:noFill/>
           <a:extLst>
             <a:ext uri="{909E8E84-426E-40DD-AFC4-6F175D3DCCD1}">
-              <a14:hiddenFill xmlns:a14="http://schemas.microsoft.com/office/drawing/2010/main" xmlns="">
+              <a14:hiddenFill xmlns="" xmlns:a14="http://schemas.microsoft.com/office/drawing/2010/main">
                 <a:solidFill>
                   <a:srgbClr xmlns:mc="http://schemas.openxmlformats.org/markup-compatibility/2006" val="FFFFFF" mc:Ignorable=""/>
                 </a:solidFill>
               </a14:hiddenFill>
             </a:ext>
             <a:ext uri="{91240B29-F687-4F45-9708-019B960494DF}">
-              <a14:hiddenLine xmlns:a14="http://schemas.microsoft.com/office/drawing/2010/main" xmlns="" w="9525">
+              <a14:hiddenLine xmlns="" xmlns:a14="http://schemas.microsoft.com/office/drawing/2010/main" w="9525">
                 <a:solidFill>
                   <a:srgbClr xmlns:mc="http://schemas.openxmlformats.org/markup-compatibility/2006" val="000000" mc:Ignorable=""/>
                 </a:solidFill>
@@ -1065,14 +1067,14 @@
           <a:noFill/>
           <a:extLst>
             <a:ext uri="{909E8E84-426E-40DD-AFC4-6F175D3DCCD1}">
-              <a14:hiddenFill xmlns:a14="http://schemas.microsoft.com/office/drawing/2010/main" xmlns="">
+              <a14:hiddenFill xmlns="" xmlns:a14="http://schemas.microsoft.com/office/drawing/2010/main">
                 <a:solidFill>
                   <a:srgbClr xmlns:mc="http://schemas.openxmlformats.org/markup-compatibility/2006" val="FFFFFF" mc:Ignorable=""/>
                 </a:solidFill>
               </a14:hiddenFill>
             </a:ext>
             <a:ext uri="{91240B29-F687-4F45-9708-019B960494DF}">
-              <a14:hiddenLine xmlns:a14="http://schemas.microsoft.com/office/drawing/2010/main" xmlns="" w="9525">
+              <a14:hiddenLine xmlns="" xmlns:a14="http://schemas.microsoft.com/office/drawing/2010/main" w="9525">
                 <a:solidFill>
                   <a:srgbClr xmlns:mc="http://schemas.openxmlformats.org/markup-compatibility/2006" val="000000" mc:Ignorable=""/>
                 </a:solidFill>
@@ -1243,14 +1245,14 @@
           <a:noFill/>
           <a:extLst>
             <a:ext uri="{909E8E84-426E-40DD-AFC4-6F175D3DCCD1}">
-              <a14:hiddenFill xmlns:a14="http://schemas.microsoft.com/office/drawing/2010/main" xmlns="">
+              <a14:hiddenFill xmlns="" xmlns:a14="http://schemas.microsoft.com/office/drawing/2010/main">
                 <a:solidFill>
                   <a:srgbClr xmlns:mc="http://schemas.openxmlformats.org/markup-compatibility/2006" val="FFFFFF" mc:Ignorable=""/>
                 </a:solidFill>
               </a14:hiddenFill>
             </a:ext>
             <a:ext uri="{91240B29-F687-4F45-9708-019B960494DF}">
-              <a14:hiddenLine xmlns:a14="http://schemas.microsoft.com/office/drawing/2010/main" xmlns="" w="9525">
+              <a14:hiddenLine xmlns="" xmlns:a14="http://schemas.microsoft.com/office/drawing/2010/main" w="9525">
                 <a:solidFill>
                   <a:srgbClr xmlns:mc="http://schemas.openxmlformats.org/markup-compatibility/2006" val="000000" mc:Ignorable=""/>
                 </a:solidFill>
@@ -1603,7 +1605,7 @@
             <a:fld id="{EDEB2150-E434-4AFF-A209-1B6D19CA9216}" type="datetimeFigureOut">
               <a:rPr lang="en-US" smtClean="0"/>
               <a:pPr/>
-              <a:t>4/12/2010</a:t>
+              <a:t>4/14/2010</a:t>
             </a:fld>
             <a:endParaRPr lang="en-US"/>
           </a:p>
@@ -1792,7 +1794,7 @@
             <a:fld id="{EDEB2150-E434-4AFF-A209-1B6D19CA9216}" type="datetimeFigureOut">
               <a:rPr lang="en-US" smtClean="0"/>
               <a:pPr/>
-              <a:t>4/12/2010</a:t>
+              <a:t>4/14/2010</a:t>
             </a:fld>
             <a:endParaRPr lang="en-US"/>
           </a:p>
@@ -1969,7 +1971,7 @@
             <a:fld id="{EDEB2150-E434-4AFF-A209-1B6D19CA9216}" type="datetimeFigureOut">
               <a:rPr lang="en-US" smtClean="0"/>
               <a:pPr/>
-              <a:t>4/12/2010</a:t>
+              <a:t>4/14/2010</a:t>
             </a:fld>
             <a:endParaRPr lang="en-US"/>
           </a:p>
@@ -2151,7 +2153,7 @@
             <a:fld id="{EDEB2150-E434-4AFF-A209-1B6D19CA9216}" type="datetimeFigureOut">
               <a:rPr lang="en-US" smtClean="0"/>
               <a:pPr/>
-              <a:t>4/12/2010</a:t>
+              <a:t>4/14/2010</a:t>
             </a:fld>
             <a:endParaRPr lang="en-US"/>
           </a:p>
@@ -2400,7 +2402,7 @@
             <a:fld id="{EDEB2150-E434-4AFF-A209-1B6D19CA9216}" type="datetimeFigureOut">
               <a:rPr lang="en-US" smtClean="0"/>
               <a:pPr/>
-              <a:t>4/12/2010</a:t>
+              <a:t>4/14/2010</a:t>
             </a:fld>
             <a:endParaRPr lang="en-US"/>
           </a:p>
@@ -2876,7 +2878,7 @@
             <a:fld id="{EDEB2150-E434-4AFF-A209-1B6D19CA9216}" type="datetimeFigureOut">
               <a:rPr lang="en-US" smtClean="0"/>
               <a:pPr/>
-              <a:t>4/12/2010</a:t>
+              <a:t>4/14/2010</a:t>
             </a:fld>
             <a:endParaRPr lang="en-US"/>
           </a:p>
@@ -3293,7 +3295,7 @@
             <a:fld id="{EDEB2150-E434-4AFF-A209-1B6D19CA9216}" type="datetimeFigureOut">
               <a:rPr lang="en-US" smtClean="0"/>
               <a:pPr/>
-              <a:t>4/12/2010</a:t>
+              <a:t>4/14/2010</a:t>
             </a:fld>
             <a:endParaRPr lang="en-US"/>
           </a:p>
@@ -3426,7 +3428,7 @@
             <a:fld id="{EDEB2150-E434-4AFF-A209-1B6D19CA9216}" type="datetimeFigureOut">
               <a:rPr lang="en-US" smtClean="0"/>
               <a:pPr/>
-              <a:t>4/12/2010</a:t>
+              <a:t>4/14/2010</a:t>
             </a:fld>
             <a:endParaRPr lang="en-US"/>
           </a:p>
@@ -3523,7 +3525,7 @@
             <a:fld id="{EDEB2150-E434-4AFF-A209-1B6D19CA9216}" type="datetimeFigureOut">
               <a:rPr lang="en-US" smtClean="0"/>
               <a:pPr/>
-              <a:t>4/12/2010</a:t>
+              <a:t>4/14/2010</a:t>
             </a:fld>
             <a:endParaRPr lang="en-US"/>
           </a:p>
@@ -3803,7 +3805,7 @@
             <a:fld id="{EDEB2150-E434-4AFF-A209-1B6D19CA9216}" type="datetimeFigureOut">
               <a:rPr lang="en-US" smtClean="0"/>
               <a:pPr/>
-              <a:t>4/12/2010</a:t>
+              <a:t>4/14/2010</a:t>
             </a:fld>
             <a:endParaRPr lang="en-US"/>
           </a:p>
@@ -4057,7 +4059,7 @@
             <a:fld id="{EDEB2150-E434-4AFF-A209-1B6D19CA9216}" type="datetimeFigureOut">
               <a:rPr lang="en-US" smtClean="0"/>
               <a:pPr/>
-              <a:t>4/12/2010</a:t>
+              <a:t>4/14/2010</a:t>
             </a:fld>
             <a:endParaRPr lang="en-US"/>
           </a:p>
@@ -4431,7 +4433,7 @@
             <a:fld id="{EDEB2150-E434-4AFF-A209-1B6D19CA9216}" type="datetimeFigureOut">
               <a:rPr lang="en-US" smtClean="0"/>
               <a:pPr/>
-              <a:t>4/12/2010</a:t>
+              <a:t>4/14/2010</a:t>
             </a:fld>
             <a:endParaRPr lang="en-US"/>
           </a:p>
@@ -4923,7 +4925,15 @@
           <a:p>
             <a:r>
               <a:rPr lang="en-US" b="1" dirty="0" smtClean="0"/>
-              <a:t>April 13, 2010</a:t>
+              <a:t>April </a:t>
+            </a:r>
+            <a:r>
+              <a:rPr lang="en-US" b="1" dirty="0" smtClean="0"/>
+              <a:t>15, </a:t>
+            </a:r>
+            <a:r>
+              <a:rPr lang="en-US" b="1" dirty="0" smtClean="0"/>
+              <a:t>2010</a:t>
             </a:r>
             <a:endParaRPr lang="en-US" b="1" dirty="0"/>
           </a:p>
@@ -5006,71 +5016,122 @@
         </p:nvSpPr>
         <p:spPr/>
         <p:txBody>
+          <a:bodyPr>
+            <a:normAutofit/>
+          </a:bodyPr>
+          <a:lstStyle/>
+          <a:p>
+            <a:r>
+              <a:rPr lang="en-US" dirty="0" smtClean="0"/>
+              <a:t>Major Functionality</a:t>
+            </a:r>
+            <a:endParaRPr lang="en-US" dirty="0"/>
+          </a:p>
+        </p:txBody>
+      </p:sp>
+      <p:sp>
+        <p:nvSpPr>
+          <p:cNvPr id="3" name="Content Placeholder 2"/>
+          <p:cNvSpPr>
+            <a:spLocks noGrp="1"/>
+          </p:cNvSpPr>
+          <p:nvPr>
+            <p:ph idx="1"/>
+          </p:nvPr>
+        </p:nvSpPr>
+        <p:spPr/>
+        <p:txBody>
           <a:bodyPr/>
           <a:lstStyle/>
           <a:p>
             <a:r>
               <a:rPr lang="en-US" dirty="0" smtClean="0"/>
-              <a:t>Technologies Used</a:t>
+              <a:t>Create Connection</a:t>
+            </a:r>
+          </a:p>
+          <a:p>
+            <a:r>
+              <a:rPr lang="en-US" dirty="0" smtClean="0"/>
+              <a:t>Edit Connection</a:t>
+            </a:r>
+          </a:p>
+          <a:p>
+            <a:r>
+              <a:rPr lang="en-US" dirty="0" smtClean="0"/>
+              <a:t>Delete Connection</a:t>
+            </a:r>
+          </a:p>
+          <a:p>
+            <a:r>
+              <a:rPr lang="en-US" dirty="0" smtClean="0"/>
+              <a:t>Generate KML File</a:t>
+            </a:r>
+          </a:p>
+          <a:p>
+            <a:pPr lvl="1"/>
+            <a:r>
+              <a:rPr lang="en-US" dirty="0" smtClean="0"/>
+              <a:t>Web Service</a:t>
+            </a:r>
+          </a:p>
+          <a:p>
+            <a:pPr lvl="1"/>
+            <a:r>
+              <a:rPr lang="en-US" dirty="0" smtClean="0"/>
+              <a:t>Web Application</a:t>
+            </a:r>
+          </a:p>
+          <a:p>
+            <a:r>
+              <a:rPr lang="en-US" dirty="0" smtClean="0"/>
+              <a:t>Preview KML in browser by Google Earth </a:t>
+            </a:r>
+            <a:r>
+              <a:rPr lang="en-US" dirty="0" err="1" smtClean="0"/>
+              <a:t>Plugin</a:t>
             </a:r>
             <a:endParaRPr lang="en-US" dirty="0"/>
           </a:p>
         </p:txBody>
       </p:sp>
-      <p:sp>
-        <p:nvSpPr>
-          <p:cNvPr id="3" name="Content Placeholder 2"/>
-          <p:cNvSpPr>
-            <a:spLocks noGrp="1"/>
-          </p:cNvSpPr>
-          <p:nvPr>
-            <p:ph idx="1"/>
-          </p:nvPr>
-        </p:nvSpPr>
-        <p:spPr/>
-        <p:txBody>
-          <a:bodyPr/>
-          <a:lstStyle/>
-          <a:p>
-            <a:r>
-              <a:rPr lang="en-US" dirty="0" smtClean="0"/>
-              <a:t>ASP.NET 2.0</a:t>
-            </a:r>
-          </a:p>
-          <a:p>
-            <a:endParaRPr lang="en-US" dirty="0" smtClean="0"/>
-          </a:p>
-          <a:p>
-            <a:r>
-              <a:rPr lang="en-US" dirty="0" smtClean="0"/>
-              <a:t>C#.NET</a:t>
-            </a:r>
-          </a:p>
-          <a:p>
-            <a:endParaRPr lang="en-US" dirty="0" smtClean="0"/>
-          </a:p>
-          <a:p>
-            <a:r>
-              <a:rPr lang="en-US" dirty="0" smtClean="0"/>
-              <a:t>JavaScript/Ajax</a:t>
-            </a:r>
-          </a:p>
-          <a:p>
-            <a:endParaRPr lang="en-US" dirty="0" smtClean="0"/>
-          </a:p>
-          <a:p>
-            <a:r>
-              <a:rPr lang="en-US" dirty="0" smtClean="0"/>
-              <a:t>Microsoft SQL Server Database</a:t>
-            </a:r>
-          </a:p>
-        </p:txBody>
-      </p:sp>
+      <p:pic>
+        <p:nvPicPr>
+          <p:cNvPr id="4" name="Picture 2" descr="C:\Users\nindoja\Desktop\odbc2kml\hci\HCI\graphics\odbc2kml.gif"/>
+          <p:cNvPicPr>
+            <a:picLocks noChangeAspect="1" noChangeArrowheads="1"/>
+          </p:cNvPicPr>
+          <p:nvPr/>
+        </p:nvPicPr>
+        <p:blipFill>
+          <a:blip r:embed="rId2" cstate="print"/>
+          <a:srcRect/>
+          <a:stretch>
+            <a:fillRect/>
+          </a:stretch>
+        </p:blipFill>
+        <p:spPr bwMode="auto">
+          <a:xfrm>
+            <a:off x="5029200" y="6319615"/>
+            <a:ext cx="4114800" cy="538385"/>
+          </a:xfrm>
+          <a:prstGeom prst="rect">
+            <a:avLst/>
+          </a:prstGeom>
+          <a:noFill/>
+        </p:spPr>
+      </p:pic>
     </p:spTree>
   </p:cSld>
   <p:clrMapOvr>
     <a:masterClrMapping/>
   </p:clrMapOvr>
+  <p:timing>
+    <p:tnLst>
+      <p:par>
+        <p:cTn id="1" dur="indefinite" restart="never" nodeType="tmRoot"/>
+      </p:par>
+    </p:tnLst>
+  </p:timing>
 </p:sld>
 </file>
 
@@ -5108,7 +5169,7 @@
           <a:p>
             <a:r>
               <a:rPr lang="en-US" dirty="0" smtClean="0"/>
-              <a:t>Technical Design</a:t>
+              <a:t>Technologies</a:t>
             </a:r>
             <a:endParaRPr lang="en-US" dirty="0"/>
           </a:p>
@@ -5126,12 +5187,14 @@
         </p:nvSpPr>
         <p:spPr/>
         <p:txBody>
-          <a:bodyPr/>
+          <a:bodyPr>
+            <a:normAutofit/>
+          </a:bodyPr>
           <a:lstStyle/>
           <a:p>
             <a:r>
               <a:rPr lang="en-US" dirty="0" smtClean="0"/>
-              <a:t>Core ODBC2KML classes</a:t>
+              <a:t>ASP.NET 2.0</a:t>
             </a:r>
           </a:p>
           <a:p>
@@ -5140,7 +5203,7 @@
           <a:p>
             <a:r>
               <a:rPr lang="en-US" dirty="0" smtClean="0"/>
-              <a:t>ODBC Database Connections</a:t>
+              <a:t>C#.NET</a:t>
             </a:r>
           </a:p>
           <a:p>
@@ -5149,26 +5212,66 @@
           <a:p>
             <a:r>
               <a:rPr lang="en-US" dirty="0" smtClean="0"/>
-              <a:t>Public facing Web Pages</a:t>
-            </a:r>
-          </a:p>
-          <a:p>
+              <a:t>JavaScript/Ajax</a:t>
+            </a:r>
             <a:endParaRPr lang="en-US" dirty="0" smtClean="0"/>
           </a:p>
           <a:p>
+            <a:endParaRPr lang="en-US" dirty="0" smtClean="0"/>
+          </a:p>
+          <a:p>
             <a:r>
               <a:rPr lang="en-US" dirty="0" smtClean="0"/>
-              <a:t>KML Generation Web Service</a:t>
-            </a:r>
-            <a:endParaRPr lang="en-US" dirty="0"/>
-          </a:p>
-        </p:txBody>
-      </p:sp>
+              <a:t>Microsoft SQL Server </a:t>
+            </a:r>
+            <a:r>
+              <a:rPr lang="en-US" dirty="0" smtClean="0"/>
+              <a:t>Database</a:t>
+            </a:r>
+          </a:p>
+          <a:p>
+            <a:endParaRPr lang="en-US" dirty="0" smtClean="0"/>
+          </a:p>
+        </p:txBody>
+      </p:sp>
+      <p:pic>
+        <p:nvPicPr>
+          <p:cNvPr id="4" name="Picture 2" descr="C:\Users\nindoja\Desktop\odbc2kml\hci\HCI\graphics\odbc2kml.gif"/>
+          <p:cNvPicPr>
+            <a:picLocks noChangeAspect="1" noChangeArrowheads="1"/>
+          </p:cNvPicPr>
+          <p:nvPr/>
+        </p:nvPicPr>
+        <p:blipFill>
+          <a:blip r:embed="rId2" cstate="print"/>
+          <a:srcRect/>
+          <a:stretch>
+            <a:fillRect/>
+          </a:stretch>
+        </p:blipFill>
+        <p:spPr bwMode="auto">
+          <a:xfrm>
+            <a:off x="5029200" y="6319615"/>
+            <a:ext cx="4114800" cy="538385"/>
+          </a:xfrm>
+          <a:prstGeom prst="rect">
+            <a:avLst/>
+          </a:prstGeom>
+          <a:noFill/>
+        </p:spPr>
+      </p:pic>
     </p:spTree>
   </p:cSld>
   <p:clrMapOvr>
     <a:masterClrMapping/>
   </p:clrMapOvr>
+  <p:timing>
+    <p:tnLst>
+      <p:par>
+        <p:cTn id="1" dur="indefinite" restart="never" nodeType="tmRoot"/>
+      </p:par>
+    </p:tnLst>
+  </p:timing>
 </p:sld>
 </file>
 
@@ -5206,28 +5309,75 @@
           <a:p>
             <a:r>
               <a:rPr lang="en-US" dirty="0" smtClean="0"/>
-              <a:t>Design – Main Page</a:t>
+              <a:t>Google Integration</a:t>
             </a:r>
             <a:endParaRPr lang="en-US" dirty="0"/>
+          </a:p>
+        </p:txBody>
+      </p:sp>
+      <p:sp>
+        <p:nvSpPr>
+          <p:cNvPr id="3" name="Content Placeholder 2"/>
+          <p:cNvSpPr>
+            <a:spLocks noGrp="1"/>
+          </p:cNvSpPr>
+          <p:nvPr>
+            <p:ph idx="1"/>
+          </p:nvPr>
+        </p:nvSpPr>
+        <p:spPr/>
+        <p:txBody>
+          <a:bodyPr/>
+          <a:lstStyle/>
+          <a:p>
+            <a:r>
+              <a:rPr lang="en-US" dirty="0" smtClean="0"/>
+              <a:t>Google Code</a:t>
+            </a:r>
+          </a:p>
+          <a:p>
+            <a:pPr lvl="1"/>
+            <a:r>
+              <a:rPr lang="en-US" dirty="0" smtClean="0"/>
+              <a:t>Wiki</a:t>
+            </a:r>
+          </a:p>
+          <a:p>
+            <a:pPr lvl="1"/>
+            <a:r>
+              <a:rPr lang="en-US" dirty="0" smtClean="0"/>
+              <a:t>Bug tracker</a:t>
+            </a:r>
+          </a:p>
+          <a:p>
+            <a:pPr lvl="1"/>
+            <a:r>
+              <a:rPr lang="en-US" dirty="0" smtClean="0"/>
+              <a:t>Version control</a:t>
+            </a:r>
+          </a:p>
+          <a:p>
+            <a:pPr lvl="1"/>
+            <a:endParaRPr lang="en-US" dirty="0" smtClean="0"/>
+          </a:p>
+          <a:p>
+            <a:r>
+              <a:rPr lang="en-US" dirty="0" smtClean="0"/>
+              <a:t>Google Earth</a:t>
+            </a:r>
           </a:p>
         </p:txBody>
       </p:sp>
       <p:pic>
         <p:nvPicPr>
-          <p:cNvPr id="1026" name="Picture 2"/>
+          <p:cNvPr id="4" name="Picture 2" descr="C:\Users\nindoja\Desktop\odbc2kml\hci\HCI\graphics\odbc2kml.gif"/>
           <p:cNvPicPr>
             <a:picLocks noChangeAspect="1" noChangeArrowheads="1"/>
           </p:cNvPicPr>
           <p:nvPr/>
         </p:nvPicPr>
         <p:blipFill>
-          <a:blip r:embed="rId2" cstate="print">
-            <a:extLst>
-              <a:ext uri="{28A0092B-C50C-407E-A947-70E740481C1C}">
-                <a14:useLocalDpi xmlns:a14="http://schemas.microsoft.com/office/drawing/2010/main" xmlns="" val="0"/>
-              </a:ext>
-            </a:extLst>
-          </a:blip>
+          <a:blip r:embed="rId2" cstate="print"/>
           <a:srcRect/>
           <a:stretch>
             <a:fillRect/>
@@ -5235,53 +5385,16 @@
         </p:blipFill>
         <p:spPr bwMode="auto">
           <a:xfrm>
-            <a:off x="381000" y="2057400"/>
-            <a:ext cx="8583743" cy="4114800"/>
+            <a:off x="5029200" y="6319615"/>
+            <a:ext cx="4114800" cy="538385"/>
           </a:xfrm>
           <a:prstGeom prst="rect">
             <a:avLst/>
           </a:prstGeom>
           <a:noFill/>
-          <a:ln>
-            <a:noFill/>
-          </a:ln>
-          <a:effectLst/>
-          <a:extLst>
-            <a:ext uri="{909E8E84-426E-40DD-AFC4-6F175D3DCCD1}">
-              <a14:hiddenFill xmlns:a14="http://schemas.microsoft.com/office/drawing/2010/main" xmlns="">
-                <a:solidFill>
-                  <a:schemeClr val="accent1"/>
-                </a:solidFill>
-              </a14:hiddenFill>
-            </a:ext>
-            <a:ext uri="{91240B29-F687-4F45-9708-019B960494DF}">
-              <a14:hiddenLine xmlns:a14="http://schemas.microsoft.com/office/drawing/2010/main" xmlns="" w="9525">
-                <a:solidFill>
-                  <a:schemeClr val="tx1"/>
-                </a:solidFill>
-                <a:miter lim="800000"/>
-                <a:headEnd/>
-                <a:tailEnd/>
-              </a14:hiddenLine>
-            </a:ext>
-            <a:ext uri="{AF507438-7753-43E0-B8FC-AC1667EBCBE1}">
-              <a14:hiddenEffects xmlns:a14="http://schemas.microsoft.com/office/drawing/2010/main" xmlns="">
-                <a:effectLst>
-                  <a:outerShdw dist="35921" dir="2700000" algn="ctr" rotWithShape="0">
-                    <a:schemeClr val="bg2"/>
-                  </a:outerShdw>
-                </a:effectLst>
-              </a14:hiddenEffects>
-            </a:ext>
-          </a:extLst>
         </p:spPr>
       </p:pic>
     </p:spTree>
-    <p:extLst>
-      <p:ext uri="{BB962C8B-B14F-4D97-AF65-F5344CB8AC3E}">
-        <p14:creationId xmlns:p14="http://schemas.microsoft.com/office/powerpoint/2010/main" xmlns="" val="3304650941"/>
-      </p:ext>
-    </p:extLst>
   </p:cSld>
   <p:clrMapOvr>
     <a:masterClrMapping/>
@@ -5323,31 +5436,64 @@
             <p:ph type="title"/>
           </p:nvPr>
         </p:nvSpPr>
-        <p:spPr>
-          <a:xfrm>
-            <a:off x="76200" y="267494"/>
-            <a:ext cx="8915400" cy="1399032"/>
-          </a:xfrm>
-        </p:spPr>
+        <p:spPr/>
         <p:txBody>
           <a:bodyPr/>
           <a:lstStyle/>
           <a:p>
             <a:r>
               <a:rPr lang="en-US" dirty="0" smtClean="0"/>
-              <a:t>Design – </a:t>
-            </a:r>
-            <a:r>
-              <a:rPr lang="en-US" dirty="0" err="1" smtClean="0"/>
-              <a:t>ConnDetails</a:t>
-            </a:r>
+              <a:t>Technical Design</a:t>
+            </a:r>
+            <a:endParaRPr lang="en-US" dirty="0"/>
+          </a:p>
+        </p:txBody>
+      </p:sp>
+      <p:sp>
+        <p:nvSpPr>
+          <p:cNvPr id="3" name="Content Placeholder 2"/>
+          <p:cNvSpPr>
+            <a:spLocks noGrp="1"/>
+          </p:cNvSpPr>
+          <p:nvPr>
+            <p:ph idx="1"/>
+          </p:nvPr>
+        </p:nvSpPr>
+        <p:spPr/>
+        <p:txBody>
+          <a:bodyPr/>
+          <a:lstStyle/>
+          <a:p>
             <a:r>
               <a:rPr lang="en-US" dirty="0" smtClean="0"/>
-              <a:t>: </a:t>
-            </a:r>
-            <a:r>
-              <a:rPr lang="en-US" dirty="0" err="1" smtClean="0"/>
-              <a:t>ConnInfo</a:t>
+              <a:t>Core ODBC2KML classes</a:t>
+            </a:r>
+          </a:p>
+          <a:p>
+            <a:endParaRPr lang="en-US" dirty="0" smtClean="0"/>
+          </a:p>
+          <a:p>
+            <a:r>
+              <a:rPr lang="en-US" dirty="0" smtClean="0"/>
+              <a:t>ODBC Database Connections</a:t>
+            </a:r>
+          </a:p>
+          <a:p>
+            <a:endParaRPr lang="en-US" dirty="0" smtClean="0"/>
+          </a:p>
+          <a:p>
+            <a:r>
+              <a:rPr lang="en-US" dirty="0" smtClean="0"/>
+              <a:t>Public facing Web Pages</a:t>
+            </a:r>
+          </a:p>
+          <a:p>
+            <a:endParaRPr lang="en-US" dirty="0" smtClean="0"/>
+          </a:p>
+          <a:p>
+            <a:r>
+              <a:rPr lang="en-US" dirty="0" smtClean="0"/>
+              <a:t>KML Generation Web Service</a:t>
             </a:r>
             <a:endParaRPr lang="en-US" dirty="0"/>
           </a:p>
@@ -5355,20 +5501,14 @@
       </p:sp>
       <p:pic>
         <p:nvPicPr>
-          <p:cNvPr id="2050" name="Picture 2"/>
+          <p:cNvPr id="4" name="Picture 2" descr="C:\Users\nindoja\Desktop\odbc2kml\hci\HCI\graphics\odbc2kml.gif"/>
           <p:cNvPicPr>
             <a:picLocks noChangeAspect="1" noChangeArrowheads="1"/>
           </p:cNvPicPr>
           <p:nvPr/>
         </p:nvPicPr>
         <p:blipFill>
-          <a:blip r:embed="rId2" cstate="print">
-            <a:extLst>
-              <a:ext uri="{28A0092B-C50C-407E-A947-70E740481C1C}">
-                <a14:useLocalDpi xmlns:a14="http://schemas.microsoft.com/office/drawing/2010/main" xmlns="" val="0"/>
-              </a:ext>
-            </a:extLst>
-          </a:blip>
+          <a:blip r:embed="rId2" cstate="print"/>
           <a:srcRect/>
           <a:stretch>
             <a:fillRect/>
@@ -5376,53 +5516,16 @@
         </p:blipFill>
         <p:spPr bwMode="auto">
           <a:xfrm>
-            <a:off x="228600" y="1905000"/>
-            <a:ext cx="8763000" cy="4377217"/>
+            <a:off x="5029200" y="6319615"/>
+            <a:ext cx="4114800" cy="538385"/>
           </a:xfrm>
           <a:prstGeom prst="rect">
             <a:avLst/>
           </a:prstGeom>
           <a:noFill/>
-          <a:ln>
-            <a:noFill/>
-          </a:ln>
-          <a:effectLst/>
-          <a:extLst>
-            <a:ext uri="{909E8E84-426E-40DD-AFC4-6F175D3DCCD1}">
-              <a14:hiddenFill xmlns:a14="http://schemas.microsoft.com/office/drawing/2010/main" xmlns="">
-                <a:solidFill>
-                  <a:schemeClr val="accent1"/>
-                </a:solidFill>
-              </a14:hiddenFill>
-            </a:ext>
-            <a:ext uri="{91240B29-F687-4F45-9708-019B960494DF}">
-              <a14:hiddenLine xmlns:a14="http://schemas.microsoft.com/office/drawing/2010/main" xmlns="" w="9525">
-                <a:solidFill>
-                  <a:schemeClr val="tx1"/>
-                </a:solidFill>
-                <a:miter lim="800000"/>
-                <a:headEnd/>
-                <a:tailEnd/>
-              </a14:hiddenLine>
-            </a:ext>
-            <a:ext uri="{AF507438-7753-43E0-B8FC-AC1667EBCBE1}">
-              <a14:hiddenEffects xmlns:a14="http://schemas.microsoft.com/office/drawing/2010/main" xmlns="">
-                <a:effectLst>
-                  <a:outerShdw dist="35921" dir="2700000" algn="ctr" rotWithShape="0">
-                    <a:schemeClr val="bg2"/>
-                  </a:outerShdw>
-                </a:effectLst>
-              </a14:hiddenEffects>
-            </a:ext>
-          </a:extLst>
         </p:spPr>
       </p:pic>
     </p:spTree>
-    <p:extLst>
-      <p:ext uri="{BB962C8B-B14F-4D97-AF65-F5344CB8AC3E}">
-        <p14:creationId xmlns:p14="http://schemas.microsoft.com/office/powerpoint/2010/main" xmlns="" val="1904229652"/>
-      </p:ext>
-    </p:extLst>
   </p:cSld>
   <p:clrMapOvr>
     <a:masterClrMapping/>
@@ -5464,27 +5567,14 @@
             <p:ph type="title"/>
           </p:nvPr>
         </p:nvSpPr>
-        <p:spPr>
-          <a:xfrm>
-            <a:off x="76200" y="267494"/>
-            <a:ext cx="8915400" cy="1399032"/>
-          </a:xfrm>
-        </p:spPr>
+        <p:spPr/>
         <p:txBody>
           <a:bodyPr/>
           <a:lstStyle/>
           <a:p>
             <a:r>
               <a:rPr lang="en-US" dirty="0" smtClean="0"/>
-              <a:t>Design – </a:t>
-            </a:r>
-            <a:r>
-              <a:rPr lang="en-US" dirty="0" err="1" smtClean="0"/>
-              <a:t>ConnDetails</a:t>
-            </a:r>
-            <a:r>
-              <a:rPr lang="en-US" dirty="0" smtClean="0"/>
-              <a:t>: Mapping</a:t>
+              <a:t>Design – Main Page</a:t>
             </a:r>
             <a:endParaRPr lang="en-US" dirty="0"/>
           </a:p>
@@ -5492,7 +5582,7 @@
       </p:sp>
       <p:pic>
         <p:nvPicPr>
-          <p:cNvPr id="3074" name="Picture 2"/>
+          <p:cNvPr id="1026" name="Picture 2"/>
           <p:cNvPicPr>
             <a:picLocks noChangeAspect="1" noChangeArrowheads="1"/>
           </p:cNvPicPr>
@@ -5502,7 +5592,7 @@
           <a:blip r:embed="rId2" cstate="print">
             <a:extLst>
               <a:ext uri="{28A0092B-C50C-407E-A947-70E740481C1C}">
-                <a14:useLocalDpi xmlns:a14="http://schemas.microsoft.com/office/drawing/2010/main" xmlns="" val="0"/>
+                <a14:useLocalDpi xmlns="" xmlns:a14="http://schemas.microsoft.com/office/drawing/2010/main" val="0"/>
               </a:ext>
             </a:extLst>
           </a:blip>
@@ -5513,8 +5603,8 @@
         </p:blipFill>
         <p:spPr bwMode="auto">
           <a:xfrm>
-            <a:off x="76200" y="2438400"/>
-            <a:ext cx="8991600" cy="3255735"/>
+            <a:off x="381000" y="2057400"/>
+            <a:ext cx="8583743" cy="4114800"/>
           </a:xfrm>
           <a:prstGeom prst="rect">
             <a:avLst/>
@@ -5526,14 +5616,14 @@
           <a:effectLst/>
           <a:extLst>
             <a:ext uri="{909E8E84-426E-40DD-AFC4-6F175D3DCCD1}">
-              <a14:hiddenFill xmlns:a14="http://schemas.microsoft.com/office/drawing/2010/main" xmlns="">
+              <a14:hiddenFill xmlns="" xmlns:a14="http://schemas.microsoft.com/office/drawing/2010/main">
                 <a:solidFill>
                   <a:schemeClr val="accent1"/>
                 </a:solidFill>
               </a14:hiddenFill>
             </a:ext>
             <a:ext uri="{91240B29-F687-4F45-9708-019B960494DF}">
-              <a14:hiddenLine xmlns:a14="http://schemas.microsoft.com/office/drawing/2010/main" xmlns="" w="9525">
+              <a14:hiddenLine xmlns="" xmlns:a14="http://schemas.microsoft.com/office/drawing/2010/main" w="9525">
                 <a:solidFill>
                   <a:schemeClr val="tx1"/>
                 </a:solidFill>
@@ -5543,7 +5633,7 @@
               </a14:hiddenLine>
             </a:ext>
             <a:ext uri="{AF507438-7753-43E0-B8FC-AC1667EBCBE1}">
-              <a14:hiddenEffects xmlns:a14="http://schemas.microsoft.com/office/drawing/2010/main" xmlns="">
+              <a14:hiddenEffects xmlns="" xmlns:a14="http://schemas.microsoft.com/office/drawing/2010/main">
                 <a:effectLst>
                   <a:outerShdw dist="35921" dir="2700000" algn="ctr" rotWithShape="0">
                     <a:schemeClr val="bg2"/>
@@ -5557,7 +5647,7 @@
     </p:spTree>
     <p:extLst>
       <p:ext uri="{BB962C8B-B14F-4D97-AF65-F5344CB8AC3E}">
-        <p14:creationId xmlns:p14="http://schemas.microsoft.com/office/powerpoint/2010/main" xmlns="" val="4164307088"/>
+        <p14:creationId xmlns="" xmlns:p14="http://schemas.microsoft.com/office/powerpoint/2010/main" val="3304650941"/>
       </p:ext>
     </p:extLst>
   </p:cSld>
@@ -5603,8 +5693,8 @@
         </p:nvSpPr>
         <p:spPr>
           <a:xfrm>
-            <a:off x="-228600" y="267494"/>
-            <a:ext cx="9372600" cy="1399032"/>
+            <a:off x="76200" y="267494"/>
+            <a:ext cx="8915400" cy="1399032"/>
           </a:xfrm>
         </p:spPr>
         <p:txBody>
@@ -5613,7 +5703,7 @@
           <a:p>
             <a:r>
               <a:rPr lang="en-US" dirty="0" smtClean="0"/>
-              <a:t>Design - </a:t>
+              <a:t>Design – </a:t>
             </a:r>
             <a:r>
               <a:rPr lang="en-US" dirty="0" err="1" smtClean="0"/>
@@ -5621,7 +5711,11 @@
             </a:r>
             <a:r>
               <a:rPr lang="en-US" dirty="0" smtClean="0"/>
-              <a:t>: Description</a:t>
+              <a:t>: </a:t>
+            </a:r>
+            <a:r>
+              <a:rPr lang="en-US" dirty="0" err="1" smtClean="0"/>
+              <a:t>ConnInfo</a:t>
             </a:r>
             <a:endParaRPr lang="en-US" dirty="0"/>
           </a:p>
@@ -5629,20 +5723,14 @@
       </p:sp>
       <p:pic>
         <p:nvPicPr>
-          <p:cNvPr id="4098" name="Picture 2"/>
+          <p:cNvPr id="31746" name="Picture 2"/>
           <p:cNvPicPr>
             <a:picLocks noChangeAspect="1" noChangeArrowheads="1"/>
           </p:cNvPicPr>
           <p:nvPr/>
         </p:nvPicPr>
         <p:blipFill>
-          <a:blip r:embed="rId2" cstate="print">
-            <a:extLst>
-              <a:ext uri="{28A0092B-C50C-407E-A947-70E740481C1C}">
-                <a14:useLocalDpi xmlns:a14="http://schemas.microsoft.com/office/drawing/2010/main" xmlns="" val="0"/>
-              </a:ext>
-            </a:extLst>
-          </a:blip>
+          <a:blip r:embed="rId2" cstate="print"/>
           <a:srcRect/>
           <a:stretch>
             <a:fillRect/>
@@ -5650,51 +5738,25 @@
         </p:blipFill>
         <p:spPr bwMode="auto">
           <a:xfrm>
-            <a:off x="76200" y="2057400"/>
-            <a:ext cx="8915400" cy="3928820"/>
+            <a:off x="333726" y="2319338"/>
+            <a:ext cx="8581674" cy="3014662"/>
           </a:xfrm>
           <a:prstGeom prst="rect">
             <a:avLst/>
           </a:prstGeom>
           <a:noFill/>
-          <a:ln>
+          <a:ln w="9525">
             <a:noFill/>
+            <a:miter lim="800000"/>
+            <a:headEnd/>
+            <a:tailEnd/>
           </a:ln>
-          <a:effectLst/>
-          <a:extLst>
-            <a:ext uri="{909E8E84-426E-40DD-AFC4-6F175D3DCCD1}">
-              <a14:hiddenFill xmlns:a14="http://schemas.microsoft.com/office/drawing/2010/main" xmlns="">
-                <a:solidFill>
-                  <a:schemeClr val="accent1"/>
-                </a:solidFill>
-              </a14:hiddenFill>
-            </a:ext>
-            <a:ext uri="{91240B29-F687-4F45-9708-019B960494DF}">
-              <a14:hiddenLine xmlns:a14="http://schemas.microsoft.com/office/drawing/2010/main" xmlns="" w="9525">
-                <a:solidFill>
-                  <a:schemeClr val="tx1"/>
-                </a:solidFill>
-                <a:miter lim="800000"/>
-                <a:headEnd/>
-                <a:tailEnd/>
-              </a14:hiddenLine>
-            </a:ext>
-            <a:ext uri="{AF507438-7753-43E0-B8FC-AC1667EBCBE1}">
-              <a14:hiddenEffects xmlns:a14="http://schemas.microsoft.com/office/drawing/2010/main" xmlns="">
-                <a:effectLst>
-                  <a:outerShdw dist="35921" dir="2700000" algn="ctr" rotWithShape="0">
-                    <a:schemeClr val="bg2"/>
-                  </a:outerShdw>
-                </a:effectLst>
-              </a14:hiddenEffects>
-            </a:ext>
-          </a:extLst>
         </p:spPr>
       </p:pic>
     </p:spTree>
     <p:extLst>
       <p:ext uri="{BB962C8B-B14F-4D97-AF65-F5344CB8AC3E}">
-        <p14:creationId xmlns:p14="http://schemas.microsoft.com/office/powerpoint/2010/main" xmlns="" val="506937973"/>
+        <p14:creationId xmlns="" xmlns:p14="http://schemas.microsoft.com/office/powerpoint/2010/main" val="1904229652"/>
       </p:ext>
     </p:extLst>
   </p:cSld>
@@ -5740,15 +5802,14 @@
         </p:nvSpPr>
         <p:spPr>
           <a:xfrm>
-            <a:off x="76200" y="76200"/>
-            <a:ext cx="8991600" cy="1399032"/>
+            <a:off x="76200" y="-332232"/>
+            <a:ext cx="8915400" cy="1399032"/>
           </a:xfrm>
         </p:spPr>
         <p:txBody>
           <a:bodyPr/>
           <a:lstStyle/>
           <a:p>
-            <a:pPr marL="55563"/>
             <a:r>
               <a:rPr lang="en-US" dirty="0" smtClean="0"/>
               <a:t>Design – </a:t>
@@ -5759,7 +5820,7 @@
             </a:r>
             <a:r>
               <a:rPr lang="en-US" dirty="0" smtClean="0"/>
-              <a:t>: Icons and Overlays</a:t>
+              <a:t>: Mapping</a:t>
             </a:r>
             <a:endParaRPr lang="en-US" dirty="0"/>
           </a:p>
@@ -5767,20 +5828,14 @@
       </p:sp>
       <p:pic>
         <p:nvPicPr>
-          <p:cNvPr id="5122" name="Picture 2"/>
+          <p:cNvPr id="30723" name="Picture 3"/>
           <p:cNvPicPr>
             <a:picLocks noChangeAspect="1" noChangeArrowheads="1"/>
           </p:cNvPicPr>
           <p:nvPr/>
         </p:nvPicPr>
         <p:blipFill>
-          <a:blip r:embed="rId2" cstate="print">
-            <a:extLst>
-              <a:ext uri="{28A0092B-C50C-407E-A947-70E740481C1C}">
-                <a14:useLocalDpi xmlns:a14="http://schemas.microsoft.com/office/drawing/2010/main" xmlns="" val="0"/>
-              </a:ext>
-            </a:extLst>
-          </a:blip>
+          <a:blip r:embed="rId2" cstate="print"/>
           <a:srcRect/>
           <a:stretch>
             <a:fillRect/>
@@ -5788,115 +5843,25 @@
         </p:blipFill>
         <p:spPr bwMode="auto">
           <a:xfrm>
-            <a:off x="0" y="1380049"/>
-            <a:ext cx="8991600" cy="2048951"/>
+            <a:off x="304800" y="771525"/>
+            <a:ext cx="8582025" cy="6086475"/>
           </a:xfrm>
           <a:prstGeom prst="rect">
             <a:avLst/>
           </a:prstGeom>
           <a:noFill/>
-          <a:ln>
+          <a:ln w="9525">
             <a:noFill/>
+            <a:miter lim="800000"/>
+            <a:headEnd/>
+            <a:tailEnd/>
           </a:ln>
-          <a:effectLst/>
-          <a:extLst>
-            <a:ext uri="{909E8E84-426E-40DD-AFC4-6F175D3DCCD1}">
-              <a14:hiddenFill xmlns:a14="http://schemas.microsoft.com/office/drawing/2010/main" xmlns="">
-                <a:solidFill>
-                  <a:schemeClr val="accent1"/>
-                </a:solidFill>
-              </a14:hiddenFill>
-            </a:ext>
-            <a:ext uri="{91240B29-F687-4F45-9708-019B960494DF}">
-              <a14:hiddenLine xmlns:a14="http://schemas.microsoft.com/office/drawing/2010/main" xmlns="" w="9525">
-                <a:solidFill>
-                  <a:schemeClr val="tx1"/>
-                </a:solidFill>
-                <a:miter lim="800000"/>
-                <a:headEnd/>
-                <a:tailEnd/>
-              </a14:hiddenLine>
-            </a:ext>
-            <a:ext uri="{AF507438-7753-43E0-B8FC-AC1667EBCBE1}">
-              <a14:hiddenEffects xmlns:a14="http://schemas.microsoft.com/office/drawing/2010/main" xmlns="">
-                <a:effectLst>
-                  <a:outerShdw dist="35921" dir="2700000" algn="ctr" rotWithShape="0">
-                    <a:schemeClr val="bg2"/>
-                  </a:outerShdw>
-                </a:effectLst>
-              </a14:hiddenEffects>
-            </a:ext>
-          </a:extLst>
-        </p:spPr>
-      </p:pic>
-      <p:pic>
-        <p:nvPicPr>
-          <p:cNvPr id="5123" name="Picture 3"/>
-          <p:cNvPicPr>
-            <a:picLocks noChangeAspect="1" noChangeArrowheads="1"/>
-          </p:cNvPicPr>
-          <p:nvPr/>
-        </p:nvPicPr>
-        <p:blipFill>
-          <a:blip r:embed="rId3" cstate="print">
-            <a:extLst>
-              <a:ext uri="{28A0092B-C50C-407E-A947-70E740481C1C}">
-                <a14:useLocalDpi xmlns:a14="http://schemas.microsoft.com/office/drawing/2010/main" xmlns="" val="0"/>
-              </a:ext>
-            </a:extLst>
-          </a:blip>
-          <a:srcRect/>
-          <a:stretch>
-            <a:fillRect/>
-          </a:stretch>
-        </p:blipFill>
-        <p:spPr bwMode="auto">
-          <a:xfrm>
-            <a:off x="0" y="3518498"/>
-            <a:ext cx="9059091" cy="3339502"/>
-          </a:xfrm>
-          <a:prstGeom prst="rect">
-            <a:avLst/>
-          </a:prstGeom>
-          <a:noFill/>
-          <a:ln>
-            <a:noFill/>
-          </a:ln>
-          <a:effectLst/>
-          <a:extLst>
-            <a:ext uri="{909E8E84-426E-40DD-AFC4-6F175D3DCCD1}">
-              <a14:hiddenFill xmlns:a14="http://schemas.microsoft.com/office/drawing/2010/main" xmlns="">
-                <a:solidFill>
-                  <a:schemeClr val="accent1"/>
-                </a:solidFill>
-              </a14:hiddenFill>
-            </a:ext>
-            <a:ext uri="{91240B29-F687-4F45-9708-019B960494DF}">
-              <a14:hiddenLine xmlns:a14="http://schemas.microsoft.com/office/drawing/2010/main" xmlns="" w="9525">
-                <a:solidFill>
-                  <a:schemeClr val="tx1"/>
-                </a:solidFill>
-                <a:miter lim="800000"/>
-                <a:headEnd/>
-                <a:tailEnd/>
-              </a14:hiddenLine>
-            </a:ext>
-            <a:ext uri="{AF507438-7753-43E0-B8FC-AC1667EBCBE1}">
-              <a14:hiddenEffects xmlns:a14="http://schemas.microsoft.com/office/drawing/2010/main" xmlns="">
-                <a:effectLst>
-                  <a:outerShdw dist="35921" dir="2700000" algn="ctr" rotWithShape="0">
-                    <a:schemeClr val="bg2"/>
-                  </a:outerShdw>
-                </a:effectLst>
-              </a14:hiddenEffects>
-            </a:ext>
-          </a:extLst>
         </p:spPr>
       </p:pic>
     </p:spTree>
     <p:extLst>
       <p:ext uri="{BB962C8B-B14F-4D97-AF65-F5344CB8AC3E}">
-        <p14:creationId xmlns:p14="http://schemas.microsoft.com/office/powerpoint/2010/main" xmlns="" val="849199070"/>
+        <p14:creationId xmlns="" xmlns:p14="http://schemas.microsoft.com/office/powerpoint/2010/main" val="4164307088"/>
       </p:ext>
     </p:extLst>
   </p:cSld>
@@ -5942,8 +5907,8 @@
         </p:nvSpPr>
         <p:spPr>
           <a:xfrm>
-            <a:off x="457200" y="76200"/>
-            <a:ext cx="8229600" cy="1399032"/>
+            <a:off x="-228600" y="267494"/>
+            <a:ext cx="9372600" cy="1399032"/>
           </a:xfrm>
         </p:spPr>
         <p:txBody>
@@ -5956,7 +5921,11 @@
             </a:r>
             <a:r>
               <a:rPr lang="en-US" dirty="0" err="1" smtClean="0"/>
-              <a:t>KMLGenWebSVC</a:t>
+              <a:t>ConnDetails</a:t>
+            </a:r>
+            <a:r>
+              <a:rPr lang="en-US" dirty="0" smtClean="0"/>
+              <a:t>: Description</a:t>
             </a:r>
             <a:endParaRPr lang="en-US" dirty="0"/>
           </a:p>
@@ -5964,7 +5933,7 @@
       </p:sp>
       <p:pic>
         <p:nvPicPr>
-          <p:cNvPr id="7170" name="Picture 2"/>
+          <p:cNvPr id="4098" name="Picture 2"/>
           <p:cNvPicPr>
             <a:picLocks noChangeAspect="1" noChangeArrowheads="1"/>
           </p:cNvPicPr>
@@ -5974,7 +5943,7 @@
           <a:blip r:embed="rId2" cstate="print">
             <a:extLst>
               <a:ext uri="{28A0092B-C50C-407E-A947-70E740481C1C}">
-                <a14:useLocalDpi xmlns:a14="http://schemas.microsoft.com/office/drawing/2010/main" xmlns="" val="0"/>
+                <a14:useLocalDpi xmlns="" xmlns:a14="http://schemas.microsoft.com/office/drawing/2010/main" val="0"/>
               </a:ext>
             </a:extLst>
           </a:blip>
@@ -5985,8 +5954,8 @@
         </p:blipFill>
         <p:spPr bwMode="auto">
           <a:xfrm>
-            <a:off x="152400" y="1219200"/>
-            <a:ext cx="8841406" cy="5257800"/>
+            <a:off x="76200" y="2057400"/>
+            <a:ext cx="8915400" cy="3928820"/>
           </a:xfrm>
           <a:prstGeom prst="rect">
             <a:avLst/>
@@ -5998,14 +5967,14 @@
           <a:effectLst/>
           <a:extLst>
             <a:ext uri="{909E8E84-426E-40DD-AFC4-6F175D3DCCD1}">
-              <a14:hiddenFill xmlns:a14="http://schemas.microsoft.com/office/drawing/2010/main" xmlns="">
+              <a14:hiddenFill xmlns="" xmlns:a14="http://schemas.microsoft.com/office/drawing/2010/main">
                 <a:solidFill>
                   <a:schemeClr val="accent1"/>
                 </a:solidFill>
               </a14:hiddenFill>
             </a:ext>
             <a:ext uri="{91240B29-F687-4F45-9708-019B960494DF}">
-              <a14:hiddenLine xmlns:a14="http://schemas.microsoft.com/office/drawing/2010/main" xmlns="" w="9525">
+              <a14:hiddenLine xmlns="" xmlns:a14="http://schemas.microsoft.com/office/drawing/2010/main" w="9525">
                 <a:solidFill>
                   <a:schemeClr val="tx1"/>
                 </a:solidFill>
@@ -6015,7 +5984,7 @@
               </a14:hiddenLine>
             </a:ext>
             <a:ext uri="{AF507438-7753-43E0-B8FC-AC1667EBCBE1}">
-              <a14:hiddenEffects xmlns:a14="http://schemas.microsoft.com/office/drawing/2010/main" xmlns="">
+              <a14:hiddenEffects xmlns="" xmlns:a14="http://schemas.microsoft.com/office/drawing/2010/main">
                 <a:effectLst>
                   <a:outerShdw dist="35921" dir="2700000" algn="ctr" rotWithShape="0">
                     <a:schemeClr val="bg2"/>
@@ -6026,43 +5995,10 @@
           </a:extLst>
         </p:spPr>
       </p:pic>
-      <p:cxnSp>
-        <p:nvCxnSpPr>
-          <p:cNvPr id="6" name="Straight Arrow Connector 5"/>
-          <p:cNvCxnSpPr/>
-          <p:nvPr/>
-        </p:nvCxnSpPr>
-        <p:spPr>
-          <a:xfrm>
-            <a:off x="2743200" y="2209800"/>
-            <a:ext cx="3048000" cy="1676400"/>
-          </a:xfrm>
-          <a:prstGeom prst="straightConnector1">
-            <a:avLst/>
-          </a:prstGeom>
-          <a:ln w="76200">
-            <a:tailEnd type="arrow"/>
-          </a:ln>
-        </p:spPr>
-        <p:style>
-          <a:lnRef idx="3">
-            <a:schemeClr val="accent1"/>
-          </a:lnRef>
-          <a:fillRef idx="0">
-            <a:schemeClr val="accent1"/>
-          </a:fillRef>
-          <a:effectRef idx="2">
-            <a:schemeClr val="accent1"/>
-          </a:effectRef>
-          <a:fontRef idx="minor">
-            <a:schemeClr val="tx1"/>
-          </a:fontRef>
-        </p:style>
-      </p:cxnSp>
     </p:spTree>
     <p:extLst>
       <p:ext uri="{BB962C8B-B14F-4D97-AF65-F5344CB8AC3E}">
-        <p14:creationId xmlns:p14="http://schemas.microsoft.com/office/powerpoint/2010/main" xmlns="" val="1780943853"/>
+        <p14:creationId xmlns="" xmlns:p14="http://schemas.microsoft.com/office/powerpoint/2010/main" val="506937973"/>
       </p:ext>
     </p:extLst>
   </p:cSld>
@@ -6108,17 +6044,26 @@
         </p:nvSpPr>
         <p:spPr>
           <a:xfrm>
-            <a:off x="457200" y="-76200"/>
-            <a:ext cx="8229600" cy="1399032"/>
+            <a:off x="76200" y="76200"/>
+            <a:ext cx="8991600" cy="1399032"/>
           </a:xfrm>
         </p:spPr>
         <p:txBody>
           <a:bodyPr/>
           <a:lstStyle/>
           <a:p>
+            <a:pPr marL="55563"/>
             <a:r>
               <a:rPr lang="en-US" dirty="0" smtClean="0"/>
-              <a:t>Design – Preview KML</a:t>
+              <a:t>Design – </a:t>
+            </a:r>
+            <a:r>
+              <a:rPr lang="en-US" dirty="0" err="1" smtClean="0"/>
+              <a:t>ConnDetails</a:t>
+            </a:r>
+            <a:r>
+              <a:rPr lang="en-US" dirty="0" smtClean="0"/>
+              <a:t>: Icons and Overlays</a:t>
             </a:r>
             <a:endParaRPr lang="en-US" dirty="0"/>
           </a:p>
@@ -6126,7 +6071,7 @@
       </p:sp>
       <p:pic>
         <p:nvPicPr>
-          <p:cNvPr id="6146" name="Picture 2"/>
+          <p:cNvPr id="5122" name="Picture 2"/>
           <p:cNvPicPr>
             <a:picLocks noChangeAspect="1" noChangeArrowheads="1"/>
           </p:cNvPicPr>
@@ -6136,7 +6081,7 @@
           <a:blip r:embed="rId2" cstate="print">
             <a:extLst>
               <a:ext uri="{28A0092B-C50C-407E-A947-70E740481C1C}">
-                <a14:useLocalDpi xmlns:a14="http://schemas.microsoft.com/office/drawing/2010/main" xmlns="" val="0"/>
+                <a14:useLocalDpi xmlns="" xmlns:a14="http://schemas.microsoft.com/office/drawing/2010/main" val="0"/>
               </a:ext>
             </a:extLst>
           </a:blip>
@@ -6147,8 +6092,8 @@
         </p:blipFill>
         <p:spPr bwMode="auto">
           <a:xfrm>
-            <a:off x="609601" y="1101950"/>
-            <a:ext cx="7848600" cy="5756049"/>
+            <a:off x="0" y="1380049"/>
+            <a:ext cx="8991600" cy="2048951"/>
           </a:xfrm>
           <a:prstGeom prst="rect">
             <a:avLst/>
@@ -6160,14 +6105,14 @@
           <a:effectLst/>
           <a:extLst>
             <a:ext uri="{909E8E84-426E-40DD-AFC4-6F175D3DCCD1}">
-              <a14:hiddenFill xmlns:a14="http://schemas.microsoft.com/office/drawing/2010/main" xmlns="">
+              <a14:hiddenFill xmlns="" xmlns:a14="http://schemas.microsoft.com/office/drawing/2010/main">
                 <a:solidFill>
                   <a:schemeClr val="accent1"/>
                 </a:solidFill>
               </a14:hiddenFill>
             </a:ext>
             <a:ext uri="{91240B29-F687-4F45-9708-019B960494DF}">
-              <a14:hiddenLine xmlns:a14="http://schemas.microsoft.com/office/drawing/2010/main" xmlns="" w="9525">
+              <a14:hiddenLine xmlns="" xmlns:a14="http://schemas.microsoft.com/office/drawing/2010/main" w="9525">
                 <a:solidFill>
                   <a:schemeClr val="tx1"/>
                 </a:solidFill>
@@ -6177,7 +6122,7 @@
               </a14:hiddenLine>
             </a:ext>
             <a:ext uri="{AF507438-7753-43E0-B8FC-AC1667EBCBE1}">
-              <a14:hiddenEffects xmlns:a14="http://schemas.microsoft.com/office/drawing/2010/main" xmlns="">
+              <a14:hiddenEffects xmlns="" xmlns:a14="http://schemas.microsoft.com/office/drawing/2010/main">
                 <a:effectLst>
                   <a:outerShdw dist="35921" dir="2700000" algn="ctr" rotWithShape="0">
                     <a:schemeClr val="bg2"/>
@@ -6188,10 +6133,74 @@
           </a:extLst>
         </p:spPr>
       </p:pic>
+      <p:pic>
+        <p:nvPicPr>
+          <p:cNvPr id="5123" name="Picture 3"/>
+          <p:cNvPicPr>
+            <a:picLocks noChangeAspect="1" noChangeArrowheads="1"/>
+          </p:cNvPicPr>
+          <p:nvPr/>
+        </p:nvPicPr>
+        <p:blipFill>
+          <a:blip r:embed="rId3" cstate="print">
+            <a:extLst>
+              <a:ext uri="{28A0092B-C50C-407E-A947-70E740481C1C}">
+                <a14:useLocalDpi xmlns="" xmlns:a14="http://schemas.microsoft.com/office/drawing/2010/main" val="0"/>
+              </a:ext>
+            </a:extLst>
+          </a:blip>
+          <a:srcRect/>
+          <a:stretch>
+            <a:fillRect/>
+          </a:stretch>
+        </p:blipFill>
+        <p:spPr bwMode="auto">
+          <a:xfrm>
+            <a:off x="0" y="3518498"/>
+            <a:ext cx="9059091" cy="3339502"/>
+          </a:xfrm>
+          <a:prstGeom prst="rect">
+            <a:avLst/>
+          </a:prstGeom>
+          <a:noFill/>
+          <a:ln>
+            <a:noFill/>
+          </a:ln>
+          <a:effectLst/>
+          <a:extLst>
+            <a:ext uri="{909E8E84-426E-40DD-AFC4-6F175D3DCCD1}">
+              <a14:hiddenFill xmlns="" xmlns:a14="http://schemas.microsoft.com/office/drawing/2010/main">
+                <a:solidFill>
+                  <a:schemeClr val="accent1"/>
+                </a:solidFill>
+              </a14:hiddenFill>
+            </a:ext>
+            <a:ext uri="{91240B29-F687-4F45-9708-019B960494DF}">
+              <a14:hiddenLine xmlns="" xmlns:a14="http://schemas.microsoft.com/office/drawing/2010/main" w="9525">
+                <a:solidFill>
+                  <a:schemeClr val="tx1"/>
+                </a:solidFill>
+                <a:miter lim="800000"/>
+                <a:headEnd/>
+                <a:tailEnd/>
+              </a14:hiddenLine>
+            </a:ext>
+            <a:ext uri="{AF507438-7753-43E0-B8FC-AC1667EBCBE1}">
+              <a14:hiddenEffects xmlns="" xmlns:a14="http://schemas.microsoft.com/office/drawing/2010/main">
+                <a:effectLst>
+                  <a:outerShdw dist="35921" dir="2700000" algn="ctr" rotWithShape="0">
+                    <a:schemeClr val="bg2"/>
+                  </a:outerShdw>
+                </a:effectLst>
+              </a14:hiddenEffects>
+            </a:ext>
+          </a:extLst>
+        </p:spPr>
+      </p:pic>
     </p:spTree>
     <p:extLst>
       <p:ext uri="{BB962C8B-B14F-4D97-AF65-F5344CB8AC3E}">
-        <p14:creationId xmlns:p14="http://schemas.microsoft.com/office/powerpoint/2010/main" xmlns="" val="3481880667"/>
+        <p14:creationId xmlns="" xmlns:p14="http://schemas.microsoft.com/office/powerpoint/2010/main" val="849199070"/>
       </p:ext>
     </p:extLst>
   </p:cSld>
@@ -6237,29 +6246,129 @@
         </p:nvSpPr>
         <p:spPr>
           <a:xfrm>
-            <a:off x="457200" y="2895600"/>
-            <a:ext cx="6172200" cy="1143000"/>
-          </a:xfrm>
-        </p:spPr>
-        <p:txBody>
-          <a:bodyPr>
-            <a:normAutofit fontScale="90000"/>
-          </a:bodyPr>
+            <a:off x="457200" y="76200"/>
+            <a:ext cx="8229600" cy="1399032"/>
+          </a:xfrm>
+        </p:spPr>
+        <p:txBody>
+          <a:bodyPr/>
           <a:lstStyle/>
           <a:p>
             <a:r>
               <a:rPr lang="en-US" dirty="0" smtClean="0"/>
-              <a:t>Requirements and Design Questions</a:t>
-            </a:r>
-            <a:r>
-              <a:rPr lang="en-US" dirty="0" smtClean="0"/>
-              <a:t>?</a:t>
+              <a:t>Design - </a:t>
+            </a:r>
+            <a:r>
+              <a:rPr lang="en-US" dirty="0" err="1" smtClean="0"/>
+              <a:t>KMLGenWebSVC</a:t>
             </a:r>
             <a:endParaRPr lang="en-US" dirty="0"/>
           </a:p>
         </p:txBody>
       </p:sp>
+      <p:pic>
+        <p:nvPicPr>
+          <p:cNvPr id="7170" name="Picture 2"/>
+          <p:cNvPicPr>
+            <a:picLocks noChangeAspect="1" noChangeArrowheads="1"/>
+          </p:cNvPicPr>
+          <p:nvPr/>
+        </p:nvPicPr>
+        <p:blipFill>
+          <a:blip r:embed="rId2" cstate="print">
+            <a:extLst>
+              <a:ext uri="{28A0092B-C50C-407E-A947-70E740481C1C}">
+                <a14:useLocalDpi xmlns="" xmlns:a14="http://schemas.microsoft.com/office/drawing/2010/main" val="0"/>
+              </a:ext>
+            </a:extLst>
+          </a:blip>
+          <a:srcRect/>
+          <a:stretch>
+            <a:fillRect/>
+          </a:stretch>
+        </p:blipFill>
+        <p:spPr bwMode="auto">
+          <a:xfrm>
+            <a:off x="152400" y="1219200"/>
+            <a:ext cx="8841406" cy="5257800"/>
+          </a:xfrm>
+          <a:prstGeom prst="rect">
+            <a:avLst/>
+          </a:prstGeom>
+          <a:noFill/>
+          <a:ln>
+            <a:noFill/>
+          </a:ln>
+          <a:effectLst/>
+          <a:extLst>
+            <a:ext uri="{909E8E84-426E-40DD-AFC4-6F175D3DCCD1}">
+              <a14:hiddenFill xmlns="" xmlns:a14="http://schemas.microsoft.com/office/drawing/2010/main">
+                <a:solidFill>
+                  <a:schemeClr val="accent1"/>
+                </a:solidFill>
+              </a14:hiddenFill>
+            </a:ext>
+            <a:ext uri="{91240B29-F687-4F45-9708-019B960494DF}">
+              <a14:hiddenLine xmlns="" xmlns:a14="http://schemas.microsoft.com/office/drawing/2010/main" w="9525">
+                <a:solidFill>
+                  <a:schemeClr val="tx1"/>
+                </a:solidFill>
+                <a:miter lim="800000"/>
+                <a:headEnd/>
+                <a:tailEnd/>
+              </a14:hiddenLine>
+            </a:ext>
+            <a:ext uri="{AF507438-7753-43E0-B8FC-AC1667EBCBE1}">
+              <a14:hiddenEffects xmlns="" xmlns:a14="http://schemas.microsoft.com/office/drawing/2010/main">
+                <a:effectLst>
+                  <a:outerShdw dist="35921" dir="2700000" algn="ctr" rotWithShape="0">
+                    <a:schemeClr val="bg2"/>
+                  </a:outerShdw>
+                </a:effectLst>
+              </a14:hiddenEffects>
+            </a:ext>
+          </a:extLst>
+        </p:spPr>
+      </p:pic>
+      <p:cxnSp>
+        <p:nvCxnSpPr>
+          <p:cNvPr id="6" name="Straight Arrow Connector 5"/>
+          <p:cNvCxnSpPr/>
+          <p:nvPr/>
+        </p:nvCxnSpPr>
+        <p:spPr>
+          <a:xfrm>
+            <a:off x="2743200" y="2209800"/>
+            <a:ext cx="3048000" cy="1676400"/>
+          </a:xfrm>
+          <a:prstGeom prst="straightConnector1">
+            <a:avLst/>
+          </a:prstGeom>
+          <a:ln w="76200">
+            <a:tailEnd type="arrow"/>
+          </a:ln>
+        </p:spPr>
+        <p:style>
+          <a:lnRef idx="3">
+            <a:schemeClr val="accent1"/>
+          </a:lnRef>
+          <a:fillRef idx="0">
+            <a:schemeClr val="accent1"/>
+          </a:fillRef>
+          <a:effectRef idx="2">
+            <a:schemeClr val="accent1"/>
+          </a:effectRef>
+          <a:fontRef idx="minor">
+            <a:schemeClr val="tx1"/>
+          </a:fontRef>
+        </p:style>
+      </p:cxnSp>
     </p:spTree>
+    <p:extLst>
+      <p:ext uri="{BB962C8B-B14F-4D97-AF65-F5344CB8AC3E}">
+        <p14:creationId xmlns="" xmlns:p14="http://schemas.microsoft.com/office/powerpoint/2010/main" val="1780943853"/>
+      </p:ext>
+    </p:extLst>
   </p:cSld>
   <p:clrMapOvr>
     <a:masterClrMapping/>
@@ -6372,6 +6481,32 @@
           </a:p>
         </p:txBody>
       </p:sp>
+      <p:pic>
+        <p:nvPicPr>
+          <p:cNvPr id="5" name="Picture 2" descr="C:\Users\nindoja\Desktop\odbc2kml\hci\HCI\graphics\odbc2kml.gif"/>
+          <p:cNvPicPr>
+            <a:picLocks noChangeAspect="1" noChangeArrowheads="1"/>
+          </p:cNvPicPr>
+          <p:nvPr/>
+        </p:nvPicPr>
+        <p:blipFill>
+          <a:blip r:embed="rId2" cstate="print"/>
+          <a:srcRect/>
+          <a:stretch>
+            <a:fillRect/>
+          </a:stretch>
+        </p:blipFill>
+        <p:spPr bwMode="auto">
+          <a:xfrm>
+            <a:off x="5029200" y="6319615"/>
+            <a:ext cx="4114800" cy="538385"/>
+          </a:xfrm>
+          <a:prstGeom prst="rect">
+            <a:avLst/>
+          </a:prstGeom>
+          <a:noFill/>
+        </p:spPr>
+      </p:pic>
     </p:spTree>
   </p:cSld>
   <p:clrMapOvr>
@@ -6388,6 +6523,135 @@
 </file>
 
 <file path=ppt/slides/slide20.xml><?xml version="1.0" encoding="utf-8"?>
+<p:sld xmlns:a="http://schemas.openxmlformats.org/drawingml/2006/main" xmlns:r="http://schemas.openxmlformats.org/officeDocument/2006/relationships" xmlns:p="http://schemas.openxmlformats.org/presentationml/2006/main">
+  <p:cSld>
+    <p:spTree>
+      <p:nvGrpSpPr>
+        <p:cNvPr id="1" name=""/>
+        <p:cNvGrpSpPr/>
+        <p:nvPr/>
+      </p:nvGrpSpPr>
+      <p:grpSpPr>
+        <a:xfrm>
+          <a:off x="0" y="0"/>
+          <a:ext cx="0" cy="0"/>
+          <a:chOff x="0" y="0"/>
+          <a:chExt cx="0" cy="0"/>
+        </a:xfrm>
+      </p:grpSpPr>
+      <p:sp>
+        <p:nvSpPr>
+          <p:cNvPr id="2" name="Title 1"/>
+          <p:cNvSpPr>
+            <a:spLocks noGrp="1"/>
+          </p:cNvSpPr>
+          <p:nvPr>
+            <p:ph type="title"/>
+          </p:nvPr>
+        </p:nvSpPr>
+        <p:spPr>
+          <a:xfrm>
+            <a:off x="457200" y="-76200"/>
+            <a:ext cx="8229600" cy="1399032"/>
+          </a:xfrm>
+        </p:spPr>
+        <p:txBody>
+          <a:bodyPr/>
+          <a:lstStyle/>
+          <a:p>
+            <a:r>
+              <a:rPr lang="en-US" dirty="0" smtClean="0"/>
+              <a:t>Design – Preview KML</a:t>
+            </a:r>
+            <a:endParaRPr lang="en-US" dirty="0"/>
+          </a:p>
+        </p:txBody>
+      </p:sp>
+      <p:pic>
+        <p:nvPicPr>
+          <p:cNvPr id="6146" name="Picture 2"/>
+          <p:cNvPicPr>
+            <a:picLocks noChangeAspect="1" noChangeArrowheads="1"/>
+          </p:cNvPicPr>
+          <p:nvPr/>
+        </p:nvPicPr>
+        <p:blipFill>
+          <a:blip r:embed="rId2" cstate="print">
+            <a:extLst>
+              <a:ext uri="{28A0092B-C50C-407E-A947-70E740481C1C}">
+                <a14:useLocalDpi xmlns="" xmlns:a14="http://schemas.microsoft.com/office/drawing/2010/main" val="0"/>
+              </a:ext>
+            </a:extLst>
+          </a:blip>
+          <a:srcRect/>
+          <a:stretch>
+            <a:fillRect/>
+          </a:stretch>
+        </p:blipFill>
+        <p:spPr bwMode="auto">
+          <a:xfrm>
+            <a:off x="609601" y="1101950"/>
+            <a:ext cx="7848600" cy="5756049"/>
+          </a:xfrm>
+          <a:prstGeom prst="rect">
+            <a:avLst/>
+          </a:prstGeom>
+          <a:noFill/>
+          <a:ln>
+            <a:noFill/>
+          </a:ln>
+          <a:effectLst/>
+          <a:extLst>
+            <a:ext uri="{909E8E84-426E-40DD-AFC4-6F175D3DCCD1}">
+              <a14:hiddenFill xmlns="" xmlns:a14="http://schemas.microsoft.com/office/drawing/2010/main">
+                <a:solidFill>
+                  <a:schemeClr val="accent1"/>
+                </a:solidFill>
+              </a14:hiddenFill>
+            </a:ext>
+            <a:ext uri="{91240B29-F687-4F45-9708-019B960494DF}">
+              <a14:hiddenLine xmlns="" xmlns:a14="http://schemas.microsoft.com/office/drawing/2010/main" w="9525">
+                <a:solidFill>
+                  <a:schemeClr val="tx1"/>
+                </a:solidFill>
+                <a:miter lim="800000"/>
+                <a:headEnd/>
+                <a:tailEnd/>
+              </a14:hiddenLine>
+            </a:ext>
+            <a:ext uri="{AF507438-7753-43E0-B8FC-AC1667EBCBE1}">
+              <a14:hiddenEffects xmlns="" xmlns:a14="http://schemas.microsoft.com/office/drawing/2010/main">
+                <a:effectLst>
+                  <a:outerShdw dist="35921" dir="2700000" algn="ctr" rotWithShape="0">
+                    <a:schemeClr val="bg2"/>
+                  </a:outerShdw>
+                </a:effectLst>
+              </a14:hiddenEffects>
+            </a:ext>
+          </a:extLst>
+        </p:spPr>
+      </p:pic>
+    </p:spTree>
+    <p:extLst>
+      <p:ext uri="{BB962C8B-B14F-4D97-AF65-F5344CB8AC3E}">
+        <p14:creationId xmlns="" xmlns:p14="http://schemas.microsoft.com/office/powerpoint/2010/main" val="3481880667"/>
+      </p:ext>
+    </p:extLst>
+  </p:cSld>
+  <p:clrMapOvr>
+    <a:masterClrMapping/>
+  </p:clrMapOvr>
+  <p:timing>
+    <p:tnLst>
+      <p:par>
+        <p:cTn id="1" dur="indefinite" restart="never" nodeType="tmRoot"/>
+      </p:par>
+    </p:tnLst>
+  </p:timing>
+</p:sld>
+</file>
+
+<file path=ppt/slides/slide21.xml><?xml version="1.0" encoding="utf-8"?>
 <p:sld xmlns:a="http://schemas.openxmlformats.org/drawingml/2006/main" xmlns:r="http://schemas.openxmlformats.org/officeDocument/2006/relationships" xmlns:p="http://schemas.openxmlformats.org/presentationml/2006/main">
   <p:cSld>
     <p:spTree>
@@ -7249,69 +7513,9 @@
     </p:spTree>
     <p:extLst>
       <p:ext uri="{BB962C8B-B14F-4D97-AF65-F5344CB8AC3E}">
-        <p14:creationId xmlns:p14="http://schemas.microsoft.com/office/powerpoint/2010/main" xmlns="" val="435735856"/>
+        <p14:creationId xmlns="" xmlns:p14="http://schemas.microsoft.com/office/powerpoint/2010/main" val="435735856"/>
       </p:ext>
     </p:extLst>
-  </p:cSld>
-  <p:clrMapOvr>
-    <a:masterClrMapping/>
-  </p:clrMapOvr>
-  <p:timing>
-    <p:tnLst>
-      <p:par>
-        <p:cTn id="1" dur="indefinite" restart="never" nodeType="tmRoot"/>
-      </p:par>
-    </p:tnLst>
-  </p:timing>
-</p:sld>
-</file>
-
-<file path=ppt/slides/slide21.xml><?xml version="1.0" encoding="utf-8"?>
-<p:sld xmlns:a="http://schemas.openxmlformats.org/drawingml/2006/main" xmlns:r="http://schemas.openxmlformats.org/officeDocument/2006/relationships" xmlns:p="http://schemas.openxmlformats.org/presentationml/2006/main">
-  <p:cSld>
-    <p:spTree>
-      <p:nvGrpSpPr>
-        <p:cNvPr id="1" name=""/>
-        <p:cNvGrpSpPr/>
-        <p:nvPr/>
-      </p:nvGrpSpPr>
-      <p:grpSpPr>
-        <a:xfrm>
-          <a:off x="0" y="0"/>
-          <a:ext cx="0" cy="0"/>
-          <a:chOff x="0" y="0"/>
-          <a:chExt cx="0" cy="0"/>
-        </a:xfrm>
-      </p:grpSpPr>
-      <p:sp>
-        <p:nvSpPr>
-          <p:cNvPr id="2" name="Title 1"/>
-          <p:cNvSpPr>
-            <a:spLocks noGrp="1"/>
-          </p:cNvSpPr>
-          <p:nvPr>
-            <p:ph type="title"/>
-          </p:nvPr>
-        </p:nvSpPr>
-        <p:spPr>
-          <a:xfrm>
-            <a:off x="457200" y="2895600"/>
-            <a:ext cx="6172200" cy="1143000"/>
-          </a:xfrm>
-        </p:spPr>
-        <p:txBody>
-          <a:bodyPr/>
-          <a:lstStyle/>
-          <a:p>
-            <a:r>
-              <a:rPr lang="en-US" dirty="0" smtClean="0"/>
-              <a:t>Demo</a:t>
-            </a:r>
-            <a:endParaRPr lang="en-US" dirty="0"/>
-          </a:p>
-        </p:txBody>
-      </p:sp>
-    </p:spTree>
   </p:cSld>
   <p:clrMapOvr>
     <a:masterClrMapping/>
@@ -7365,12 +7569,281 @@
           <a:p>
             <a:r>
               <a:rPr lang="en-US" dirty="0" smtClean="0"/>
+              <a:t>Demo</a:t>
+            </a:r>
+            <a:endParaRPr lang="en-US" dirty="0"/>
+          </a:p>
+        </p:txBody>
+      </p:sp>
+      <p:pic>
+        <p:nvPicPr>
+          <p:cNvPr id="3" name="Picture 2" descr="C:\Users\nindoja\Desktop\odbc2kml\hci\HCI\graphics\odbc2kml.gif"/>
+          <p:cNvPicPr>
+            <a:picLocks noChangeAspect="1" noChangeArrowheads="1"/>
+          </p:cNvPicPr>
+          <p:nvPr/>
+        </p:nvPicPr>
+        <p:blipFill>
+          <a:blip r:embed="rId2" cstate="print"/>
+          <a:srcRect/>
+          <a:stretch>
+            <a:fillRect/>
+          </a:stretch>
+        </p:blipFill>
+        <p:spPr bwMode="auto">
+          <a:xfrm>
+            <a:off x="5029200" y="6319615"/>
+            <a:ext cx="4114800" cy="538385"/>
+          </a:xfrm>
+          <a:prstGeom prst="rect">
+            <a:avLst/>
+          </a:prstGeom>
+          <a:noFill/>
+        </p:spPr>
+      </p:pic>
+    </p:spTree>
+  </p:cSld>
+  <p:clrMapOvr>
+    <a:masterClrMapping/>
+  </p:clrMapOvr>
+  <p:timing>
+    <p:tnLst>
+      <p:par>
+        <p:cTn id="1" dur="indefinite" restart="never" nodeType="tmRoot"/>
+      </p:par>
+    </p:tnLst>
+  </p:timing>
+</p:sld>
+</file>
+
+<file path=ppt/slides/slide23.xml><?xml version="1.0" encoding="utf-8"?>
+<p:sld xmlns:a="http://schemas.openxmlformats.org/drawingml/2006/main" xmlns:r="http://schemas.openxmlformats.org/officeDocument/2006/relationships" xmlns:p="http://schemas.openxmlformats.org/presentationml/2006/main">
+  <p:cSld>
+    <p:spTree>
+      <p:nvGrpSpPr>
+        <p:cNvPr id="1" name=""/>
+        <p:cNvGrpSpPr/>
+        <p:nvPr/>
+      </p:nvGrpSpPr>
+      <p:grpSpPr>
+        <a:xfrm>
+          <a:off x="0" y="0"/>
+          <a:ext cx="0" cy="0"/>
+          <a:chOff x="0" y="0"/>
+          <a:chExt cx="0" cy="0"/>
+        </a:xfrm>
+      </p:grpSpPr>
+      <p:sp>
+        <p:nvSpPr>
+          <p:cNvPr id="2" name="Title 1"/>
+          <p:cNvSpPr>
+            <a:spLocks noGrp="1"/>
+          </p:cNvSpPr>
+          <p:nvPr>
+            <p:ph type="title"/>
+          </p:nvPr>
+        </p:nvSpPr>
+        <p:spPr/>
+        <p:txBody>
+          <a:bodyPr/>
+          <a:lstStyle/>
+          <a:p>
+            <a:r>
+              <a:rPr lang="en-US" dirty="0" smtClean="0"/>
+              <a:t>Perfective Maintenance</a:t>
+            </a:r>
+            <a:endParaRPr lang="en-US" dirty="0"/>
+          </a:p>
+        </p:txBody>
+      </p:sp>
+      <p:sp>
+        <p:nvSpPr>
+          <p:cNvPr id="3" name="Content Placeholder 2"/>
+          <p:cNvSpPr>
+            <a:spLocks noGrp="1"/>
+          </p:cNvSpPr>
+          <p:nvPr>
+            <p:ph idx="1"/>
+          </p:nvPr>
+        </p:nvSpPr>
+        <p:spPr/>
+        <p:txBody>
+          <a:bodyPr/>
+          <a:lstStyle/>
+          <a:p>
+            <a:r>
+              <a:rPr lang="en-US" dirty="0" err="1" smtClean="0"/>
+              <a:t>CallBacks</a:t>
+            </a:r>
+            <a:r>
+              <a:rPr lang="en-US" dirty="0" smtClean="0"/>
+              <a:t> instead of </a:t>
+            </a:r>
+            <a:r>
+              <a:rPr lang="en-US" dirty="0" err="1" smtClean="0"/>
+              <a:t>PostBacks</a:t>
+            </a:r>
+            <a:endParaRPr lang="en-US" dirty="0" smtClean="0"/>
+          </a:p>
+          <a:p>
+            <a:r>
+              <a:rPr lang="en-US" dirty="0" smtClean="0"/>
+              <a:t>More JavaScript</a:t>
+            </a:r>
+          </a:p>
+          <a:p>
+            <a:r>
+              <a:rPr lang="en-US" dirty="0" smtClean="0"/>
+              <a:t>Implement more ODBC Databases</a:t>
+            </a:r>
+          </a:p>
+          <a:p>
+            <a:r>
+              <a:rPr lang="en-US" dirty="0" smtClean="0"/>
+              <a:t>Map more KML Fields</a:t>
+            </a:r>
+          </a:p>
+          <a:p>
+            <a:r>
+              <a:rPr lang="en-US" dirty="0" smtClean="0"/>
+              <a:t>Map multiple tables per connection</a:t>
+            </a:r>
+          </a:p>
+          <a:p>
+            <a:r>
+              <a:rPr lang="en-US" dirty="0" smtClean="0"/>
+              <a:t>Image generation web service</a:t>
+            </a:r>
+          </a:p>
+          <a:p>
+            <a:r>
+              <a:rPr lang="en-US" dirty="0" smtClean="0"/>
+              <a:t>Change </a:t>
+            </a:r>
+            <a:r>
+              <a:rPr lang="en-US" dirty="0" smtClean="0"/>
+              <a:t>default view in </a:t>
+            </a:r>
+            <a:r>
+              <a:rPr lang="en-US" dirty="0" smtClean="0"/>
+              <a:t>KML</a:t>
+            </a:r>
+            <a:endParaRPr lang="en-US" dirty="0" smtClean="0"/>
+          </a:p>
+        </p:txBody>
+      </p:sp>
+      <p:pic>
+        <p:nvPicPr>
+          <p:cNvPr id="4" name="Picture 2" descr="C:\Users\nindoja\Desktop\odbc2kml\hci\HCI\graphics\odbc2kml.gif"/>
+          <p:cNvPicPr>
+            <a:picLocks noChangeAspect="1" noChangeArrowheads="1"/>
+          </p:cNvPicPr>
+          <p:nvPr/>
+        </p:nvPicPr>
+        <p:blipFill>
+          <a:blip r:embed="rId2" cstate="print"/>
+          <a:srcRect/>
+          <a:stretch>
+            <a:fillRect/>
+          </a:stretch>
+        </p:blipFill>
+        <p:spPr bwMode="auto">
+          <a:xfrm>
+            <a:off x="5029200" y="6319615"/>
+            <a:ext cx="4114800" cy="538385"/>
+          </a:xfrm>
+          <a:prstGeom prst="rect">
+            <a:avLst/>
+          </a:prstGeom>
+          <a:noFill/>
+        </p:spPr>
+      </p:pic>
+    </p:spTree>
+  </p:cSld>
+  <p:clrMapOvr>
+    <a:masterClrMapping/>
+  </p:clrMapOvr>
+  <p:timing>
+    <p:tnLst>
+      <p:par>
+        <p:cTn id="1" dur="indefinite" restart="never" nodeType="tmRoot"/>
+      </p:par>
+    </p:tnLst>
+  </p:timing>
+</p:sld>
+</file>
+
+<file path=ppt/slides/slide24.xml><?xml version="1.0" encoding="utf-8"?>
+<p:sld xmlns:a="http://schemas.openxmlformats.org/drawingml/2006/main" xmlns:r="http://schemas.openxmlformats.org/officeDocument/2006/relationships" xmlns:p="http://schemas.openxmlformats.org/presentationml/2006/main">
+  <p:cSld>
+    <p:spTree>
+      <p:nvGrpSpPr>
+        <p:cNvPr id="1" name=""/>
+        <p:cNvGrpSpPr/>
+        <p:nvPr/>
+      </p:nvGrpSpPr>
+      <p:grpSpPr>
+        <a:xfrm>
+          <a:off x="0" y="0"/>
+          <a:ext cx="0" cy="0"/>
+          <a:chOff x="0" y="0"/>
+          <a:chExt cx="0" cy="0"/>
+        </a:xfrm>
+      </p:grpSpPr>
+      <p:sp>
+        <p:nvSpPr>
+          <p:cNvPr id="2" name="Title 1"/>
+          <p:cNvSpPr>
+            <a:spLocks noGrp="1"/>
+          </p:cNvSpPr>
+          <p:nvPr>
+            <p:ph type="title"/>
+          </p:nvPr>
+        </p:nvSpPr>
+        <p:spPr>
+          <a:xfrm>
+            <a:off x="457200" y="2895600"/>
+            <a:ext cx="6172200" cy="1143000"/>
+          </a:xfrm>
+        </p:spPr>
+        <p:txBody>
+          <a:bodyPr/>
+          <a:lstStyle/>
+          <a:p>
+            <a:r>
+              <a:rPr lang="en-US" dirty="0" smtClean="0"/>
               <a:t>Questions?</a:t>
             </a:r>
             <a:endParaRPr lang="en-US" dirty="0"/>
           </a:p>
         </p:txBody>
       </p:sp>
+      <p:pic>
+        <p:nvPicPr>
+          <p:cNvPr id="3" name="Picture 2" descr="C:\Users\nindoja\Desktop\odbc2kml\hci\HCI\graphics\odbc2kml.gif"/>
+          <p:cNvPicPr>
+            <a:picLocks noChangeAspect="1" noChangeArrowheads="1"/>
+          </p:cNvPicPr>
+          <p:nvPr/>
+        </p:nvPicPr>
+        <p:blipFill>
+          <a:blip r:embed="rId2" cstate="print"/>
+          <a:srcRect/>
+          <a:stretch>
+            <a:fillRect/>
+          </a:stretch>
+        </p:blipFill>
+        <p:spPr bwMode="auto">
+          <a:xfrm>
+            <a:off x="5029200" y="6319615"/>
+            <a:ext cx="4114800" cy="538385"/>
+          </a:xfrm>
+          <a:prstGeom prst="rect">
+            <a:avLst/>
+          </a:prstGeom>
+          <a:noFill/>
+        </p:spPr>
+      </p:pic>
     </p:spTree>
   </p:cSld>
   <p:clrMapOvr>
@@ -7498,17 +7971,8 @@
             </a:pPr>
             <a:r>
               <a:rPr lang="en-US" dirty="0" smtClean="0"/>
-              <a:t>Two </a:t>
-            </a:r>
-            <a:r>
-              <a:rPr lang="en-US" dirty="0" smtClean="0"/>
-              <a:t>weekly </a:t>
-            </a:r>
-            <a:r>
-              <a:rPr lang="en-US" dirty="0" smtClean="0"/>
-              <a:t>meetings </a:t>
-            </a:r>
-            <a:endParaRPr lang="en-US" dirty="0" smtClean="0"/>
+              <a:t>Two weekly meetings </a:t>
+            </a:r>
           </a:p>
           <a:p>
             <a:pPr marL="390525" indent="-293688">
@@ -7554,11 +8018,7 @@
             </a:pPr>
             <a:r>
               <a:rPr lang="en-US" dirty="0" smtClean="0"/>
-              <a:t>Weekly </a:t>
-            </a:r>
-            <a:r>
-              <a:rPr lang="en-US" dirty="0" smtClean="0"/>
-              <a:t>reports</a:t>
+              <a:t>Weekly reports</a:t>
             </a:r>
           </a:p>
           <a:p>
@@ -7610,14 +8070,39 @@
               <a:rPr lang="en-US" dirty="0" smtClean="0"/>
               <a:t>Tasks</a:t>
             </a:r>
-            <a:endParaRPr lang="en-US" dirty="0" smtClean="0"/>
-          </a:p>
-        </p:txBody>
-      </p:sp>
+          </a:p>
+        </p:txBody>
+      </p:sp>
+      <p:pic>
+        <p:nvPicPr>
+          <p:cNvPr id="4" name="Picture 2" descr="C:\Users\nindoja\Desktop\odbc2kml\hci\HCI\graphics\odbc2kml.gif"/>
+          <p:cNvPicPr>
+            <a:picLocks noChangeAspect="1" noChangeArrowheads="1"/>
+          </p:cNvPicPr>
+          <p:nvPr/>
+        </p:nvPicPr>
+        <p:blipFill>
+          <a:blip r:embed="rId3" cstate="print"/>
+          <a:srcRect/>
+          <a:stretch>
+            <a:fillRect/>
+          </a:stretch>
+        </p:blipFill>
+        <p:spPr bwMode="auto">
+          <a:xfrm>
+            <a:off x="5029200" y="6319615"/>
+            <a:ext cx="4114800" cy="538385"/>
+          </a:xfrm>
+          <a:prstGeom prst="rect">
+            <a:avLst/>
+          </a:prstGeom>
+          <a:noFill/>
+        </p:spPr>
+      </p:pic>
     </p:spTree>
     <p:extLst>
       <p:ext uri="{BB962C8B-B14F-4D97-AF65-F5344CB8AC3E}">
-        <p14:creationId xmlns:p14="http://schemas.microsoft.com/office/powerpoint/2010/main" xmlns="" val="2933005212"/>
+        <p14:creationId xmlns="" xmlns:p14="http://schemas.microsoft.com/office/powerpoint/2010/main" val="2933005212"/>
       </p:ext>
     </p:extLst>
   </p:cSld>
@@ -7775,7 +8260,6 @@
               <a:rPr lang="en-US" dirty="0" smtClean="0"/>
               <a:t>Real world development experience</a:t>
             </a:r>
-            <a:endParaRPr lang="en-US" dirty="0" smtClean="0"/>
           </a:p>
           <a:p>
             <a:pPr marL="391686" indent="-293764" fontAlgn="auto">
@@ -7879,19 +8363,7 @@
             </a:pPr>
             <a:r>
               <a:rPr lang="en-US" dirty="0" smtClean="0"/>
-              <a:t>Helps </a:t>
-            </a:r>
-            <a:r>
-              <a:rPr lang="en-US" dirty="0" smtClean="0"/>
-              <a:t>students understand </a:t>
-            </a:r>
-            <a:r>
-              <a:rPr lang="en-US" dirty="0" smtClean="0"/>
-              <a:t>the Software Engineering </a:t>
-            </a:r>
-            <a:r>
-              <a:rPr lang="en-US" dirty="0" smtClean="0"/>
-              <a:t>process</a:t>
+              <a:t>Helps students understand the Software Engineering process</a:t>
             </a:r>
           </a:p>
           <a:p>
@@ -7922,10 +8394,36 @@
           </a:p>
         </p:txBody>
       </p:sp>
+      <p:pic>
+        <p:nvPicPr>
+          <p:cNvPr id="4" name="Picture 2" descr="C:\Users\nindoja\Desktop\odbc2kml\hci\HCI\graphics\odbc2kml.gif"/>
+          <p:cNvPicPr>
+            <a:picLocks noChangeAspect="1" noChangeArrowheads="1"/>
+          </p:cNvPicPr>
+          <p:nvPr/>
+        </p:nvPicPr>
+        <p:blipFill>
+          <a:blip r:embed="rId3" cstate="print"/>
+          <a:srcRect/>
+          <a:stretch>
+            <a:fillRect/>
+          </a:stretch>
+        </p:blipFill>
+        <p:spPr bwMode="auto">
+          <a:xfrm>
+            <a:off x="5029200" y="6319615"/>
+            <a:ext cx="4114800" cy="538385"/>
+          </a:xfrm>
+          <a:prstGeom prst="rect">
+            <a:avLst/>
+          </a:prstGeom>
+          <a:noFill/>
+        </p:spPr>
+      </p:pic>
     </p:spTree>
     <p:extLst>
       <p:ext uri="{BB962C8B-B14F-4D97-AF65-F5344CB8AC3E}">
-        <p14:creationId xmlns:p14="http://schemas.microsoft.com/office/powerpoint/2010/main" xmlns="" val="3560984181"/>
+        <p14:creationId xmlns="" xmlns:p14="http://schemas.microsoft.com/office/powerpoint/2010/main" val="3560984181"/>
       </p:ext>
     </p:extLst>
   </p:cSld>
@@ -8050,14 +8548,14 @@
           </a:ln>
           <a:extLst>
             <a:ext uri="{909E8E84-426E-40DD-AFC4-6F175D3DCCD1}">
-              <a14:hiddenFill xmlns:a14="http://schemas.microsoft.com/office/drawing/2010/main" xmlns="">
+              <a14:hiddenFill xmlns="" xmlns:a14="http://schemas.microsoft.com/office/drawing/2010/main">
                 <a:solidFill>
                   <a:srgbClr xmlns:mc="http://schemas.openxmlformats.org/markup-compatibility/2006" val="FFFFFF" mc:Ignorable=""/>
                 </a:solidFill>
               </a14:hiddenFill>
             </a:ext>
             <a:ext uri="{91240B29-F687-4F45-9708-019B960494DF}">
-              <a14:hiddenLine xmlns:a14="http://schemas.microsoft.com/office/drawing/2010/main" xmlns="" w="9525">
+              <a14:hiddenLine xmlns="" xmlns:a14="http://schemas.microsoft.com/office/drawing/2010/main" w="9525">
                 <a:solidFill>
                   <a:srgbClr xmlns:mc="http://schemas.openxmlformats.org/markup-compatibility/2006" val="000000" mc:Ignorable=""/>
                 </a:solidFill>
@@ -8102,14 +8600,14 @@
           </a:ln>
           <a:extLst>
             <a:ext uri="{909E8E84-426E-40DD-AFC4-6F175D3DCCD1}">
-              <a14:hiddenFill xmlns:a14="http://schemas.microsoft.com/office/drawing/2010/main" xmlns="">
+              <a14:hiddenFill xmlns="" xmlns:a14="http://schemas.microsoft.com/office/drawing/2010/main">
                 <a:solidFill>
                   <a:srgbClr xmlns:mc="http://schemas.openxmlformats.org/markup-compatibility/2006" val="FFFFFF" mc:Ignorable=""/>
                 </a:solidFill>
               </a14:hiddenFill>
             </a:ext>
             <a:ext uri="{91240B29-F687-4F45-9708-019B960494DF}">
-              <a14:hiddenLine xmlns:a14="http://schemas.microsoft.com/office/drawing/2010/main" xmlns="" w="9525">
+              <a14:hiddenLine xmlns="" xmlns:a14="http://schemas.microsoft.com/office/drawing/2010/main" w="9525">
                 <a:solidFill>
                   <a:srgbClr xmlns:mc="http://schemas.openxmlformats.org/markup-compatibility/2006" val="000000" mc:Ignorable=""/>
                 </a:solidFill>
@@ -8152,10 +8650,36 @@
           </a:graphicData>
         </a:graphic>
       </p:graphicFrame>
+      <p:pic>
+        <p:nvPicPr>
+          <p:cNvPr id="6" name="Picture 2" descr="C:\Users\nindoja\Desktop\odbc2kml\hci\HCI\graphics\odbc2kml.gif"/>
+          <p:cNvPicPr>
+            <a:picLocks noChangeAspect="1" noChangeArrowheads="1"/>
+          </p:cNvPicPr>
+          <p:nvPr/>
+        </p:nvPicPr>
+        <p:blipFill>
+          <a:blip r:embed="rId4" cstate="print"/>
+          <a:srcRect/>
+          <a:stretch>
+            <a:fillRect/>
+          </a:stretch>
+        </p:blipFill>
+        <p:spPr bwMode="auto">
+          <a:xfrm>
+            <a:off x="5029200" y="6319615"/>
+            <a:ext cx="4114800" cy="538385"/>
+          </a:xfrm>
+          <a:prstGeom prst="rect">
+            <a:avLst/>
+          </a:prstGeom>
+          <a:noFill/>
+        </p:spPr>
+      </p:pic>
     </p:spTree>
     <p:extLst>
       <p:ext uri="{BB962C8B-B14F-4D97-AF65-F5344CB8AC3E}">
-        <p14:creationId xmlns:p14="http://schemas.microsoft.com/office/powerpoint/2010/main" xmlns="" val="4168669383"/>
+        <p14:creationId xmlns="" xmlns:p14="http://schemas.microsoft.com/office/powerpoint/2010/main" val="4168669383"/>
       </p:ext>
     </p:extLst>
   </p:cSld>
@@ -8265,6 +8789,32 @@
           </a:p>
         </p:txBody>
       </p:sp>
+      <p:pic>
+        <p:nvPicPr>
+          <p:cNvPr id="6" name="Picture 2" descr="C:\Users\nindoja\Desktop\odbc2kml\hci\HCI\graphics\odbc2kml.gif"/>
+          <p:cNvPicPr>
+            <a:picLocks noChangeAspect="1" noChangeArrowheads="1"/>
+          </p:cNvPicPr>
+          <p:nvPr/>
+        </p:nvPicPr>
+        <p:blipFill>
+          <a:blip r:embed="rId3" cstate="print"/>
+          <a:srcRect/>
+          <a:stretch>
+            <a:fillRect/>
+          </a:stretch>
+        </p:blipFill>
+        <p:spPr bwMode="auto">
+          <a:xfrm>
+            <a:off x="5029200" y="6319615"/>
+            <a:ext cx="4114800" cy="538385"/>
+          </a:xfrm>
+          <a:prstGeom prst="rect">
+            <a:avLst/>
+          </a:prstGeom>
+          <a:noFill/>
+        </p:spPr>
+      </p:pic>
     </p:spTree>
   </p:cSld>
   <p:clrMapOvr>
@@ -8314,7 +8864,7 @@
           <a:p>
             <a:r>
               <a:rPr lang="en-US" dirty="0" smtClean="0"/>
-              <a:t>Why ODBC2KML?</a:t>
+              <a:t>Current Situation</a:t>
             </a:r>
             <a:endParaRPr lang="en-US" dirty="0"/>
           </a:p>
@@ -8337,31 +8887,67 @@
           <a:p>
             <a:r>
               <a:rPr lang="en-US" dirty="0" smtClean="0"/>
-              <a:t>Current situation: manually generating </a:t>
-            </a:r>
-            <a:r>
-              <a:rPr lang="en-US" smtClean="0"/>
-              <a:t>KML from </a:t>
-            </a:r>
+              <a:t>Manual database parsing</a:t>
+            </a:r>
+          </a:p>
+          <a:p>
+            <a:pPr lvl="1"/>
             <a:r>
               <a:rPr lang="en-US" dirty="0" smtClean="0"/>
-              <a:t>databases</a:t>
-            </a:r>
-          </a:p>
-          <a:p>
-            <a:pPr>
-              <a:buNone/>
-            </a:pPr>
+              <a:t>On demand</a:t>
+            </a:r>
+          </a:p>
+          <a:p>
+            <a:pPr lvl="1"/>
+            <a:r>
+              <a:rPr lang="en-US" dirty="0" smtClean="0"/>
+              <a:t>Any database</a:t>
+            </a:r>
+          </a:p>
+          <a:p>
+            <a:pPr lvl="1"/>
+            <a:r>
+              <a:rPr lang="en-US" dirty="0" smtClean="0"/>
+              <a:t>Time consuming</a:t>
+            </a:r>
             <a:endParaRPr lang="en-US" dirty="0" smtClean="0"/>
           </a:p>
           <a:p>
+            <a:pPr lvl="1"/>
             <a:r>
               <a:rPr lang="en-US" dirty="0" smtClean="0"/>
-              <a:t>Solution: create a system that automates the KML generation</a:t>
-            </a:r>
-          </a:p>
-        </p:txBody>
-      </p:sp>
+              <a:t>End result: KML file</a:t>
+            </a:r>
+            <a:endParaRPr lang="en-US" dirty="0" smtClean="0"/>
+          </a:p>
+        </p:txBody>
+      </p:sp>
+      <p:pic>
+        <p:nvPicPr>
+          <p:cNvPr id="4" name="Picture 2" descr="C:\Users\nindoja\Desktop\odbc2kml\hci\HCI\graphics\odbc2kml.gif"/>
+          <p:cNvPicPr>
+            <a:picLocks noChangeAspect="1" noChangeArrowheads="1"/>
+          </p:cNvPicPr>
+          <p:nvPr/>
+        </p:nvPicPr>
+        <p:blipFill>
+          <a:blip r:embed="rId2" cstate="print"/>
+          <a:srcRect/>
+          <a:stretch>
+            <a:fillRect/>
+          </a:stretch>
+        </p:blipFill>
+        <p:spPr bwMode="auto">
+          <a:xfrm>
+            <a:off x="5029200" y="6319615"/>
+            <a:ext cx="4114800" cy="538385"/>
+          </a:xfrm>
+          <a:prstGeom prst="rect">
+            <a:avLst/>
+          </a:prstGeom>
+          <a:noFill/>
+        </p:spPr>
+      </p:pic>
     </p:spTree>
   </p:cSld>
   <p:clrMapOvr>
@@ -8411,7 +8997,7 @@
           <a:p>
             <a:r>
               <a:rPr lang="en-US" dirty="0" smtClean="0"/>
-              <a:t>Project Overview</a:t>
+              <a:t>Solution</a:t>
             </a:r>
             <a:endParaRPr lang="en-US" dirty="0"/>
           </a:p>
@@ -8434,68 +9020,76 @@
           <a:p>
             <a:r>
               <a:rPr lang="en-US" dirty="0" smtClean="0"/>
-              <a:t>Connect to a database</a:t>
-            </a:r>
-          </a:p>
-          <a:p>
-            <a:pPr>
-              <a:buNone/>
-            </a:pPr>
-            <a:endParaRPr lang="en-US" dirty="0" smtClean="0"/>
-          </a:p>
-          <a:p>
+              <a:t>ODBC2KML</a:t>
+            </a:r>
+          </a:p>
+          <a:p>
+            <a:pPr lvl="1"/>
             <a:r>
               <a:rPr lang="en-US" dirty="0" smtClean="0"/>
-              <a:t>M</a:t>
-            </a:r>
+              <a:t>Easy to use </a:t>
+            </a:r>
+          </a:p>
+          <a:p>
+            <a:pPr lvl="1"/>
             <a:r>
               <a:rPr lang="en-US" dirty="0" smtClean="0"/>
-              <a:t>ap database field(s) to KML field(s)</a:t>
+              <a:t>Intuitive interface design</a:t>
             </a:r>
           </a:p>
           <a:p>
             <a:pPr lvl="1"/>
             <a:r>
               <a:rPr lang="en-US" dirty="0" smtClean="0"/>
-              <a:t>Latitude/Longitude</a:t>
+              <a:t>Preview KML</a:t>
             </a:r>
           </a:p>
           <a:p>
             <a:pPr lvl="1"/>
             <a:r>
-              <a:rPr lang="en-US" dirty="0" err="1" smtClean="0"/>
-              <a:t>Placemark</a:t>
-            </a:r>
-            <a:r>
               <a:rPr lang="en-US" dirty="0" smtClean="0"/>
-              <a:t> Name</a:t>
+              <a:t>Automated KML generation</a:t>
             </a:r>
           </a:p>
           <a:p>
             <a:pPr lvl="1"/>
             <a:r>
               <a:rPr lang="en-US" dirty="0" smtClean="0"/>
-              <a:t>Insert Field Values into Description</a:t>
-            </a:r>
-          </a:p>
-          <a:p>
-            <a:pPr lvl="1">
-              <a:buNone/>
-            </a:pPr>
-            <a:endParaRPr lang="en-US" dirty="0" smtClean="0"/>
-          </a:p>
-          <a:p>
-            <a:r>
-              <a:rPr lang="en-US" dirty="0" smtClean="0"/>
-              <a:t>Generate KML</a:t>
+              <a:t>End result: KML file</a:t>
             </a:r>
           </a:p>
           <a:p>
             <a:pPr lvl="1"/>
-            <a:endParaRPr lang="en-US" dirty="0" smtClean="0"/>
-          </a:p>
-        </p:txBody>
-      </p:sp>
+            <a:endParaRPr lang="en-US" dirty="0"/>
+          </a:p>
+        </p:txBody>
+      </p:sp>
+      <p:pic>
+        <p:nvPicPr>
+          <p:cNvPr id="5" name="Picture 2" descr="C:\Users\nindoja\Desktop\odbc2kml\hci\HCI\graphics\odbc2kml.gif"/>
+          <p:cNvPicPr>
+            <a:picLocks noChangeAspect="1" noChangeArrowheads="1"/>
+          </p:cNvPicPr>
+          <p:nvPr/>
+        </p:nvPicPr>
+        <p:blipFill>
+          <a:blip r:embed="rId2" cstate="print"/>
+          <a:srcRect/>
+          <a:stretch>
+            <a:fillRect/>
+          </a:stretch>
+        </p:blipFill>
+        <p:spPr bwMode="auto">
+          <a:xfrm>
+            <a:off x="5029200" y="6319615"/>
+            <a:ext cx="4114800" cy="538385"/>
+          </a:xfrm>
+          <a:prstGeom prst="rect">
+            <a:avLst/>
+          </a:prstGeom>
+          <a:noFill/>
+        </p:spPr>
+      </p:pic>
     </p:spTree>
   </p:cSld>
   <p:clrMapOvr>
@@ -8540,92 +9134,118 @@
         </p:nvSpPr>
         <p:spPr/>
         <p:txBody>
-          <a:bodyPr>
-            <a:normAutofit/>
-          </a:bodyPr>
-          <a:lstStyle/>
-          <a:p>
-            <a:r>
-              <a:rPr lang="en-US" dirty="0" smtClean="0"/>
-              <a:t>Major </a:t>
-            </a:r>
-            <a:r>
-              <a:rPr lang="en-US" dirty="0" smtClean="0"/>
-              <a:t>Functionality</a:t>
-            </a:r>
-            <a:endParaRPr lang="en-US" dirty="0"/>
-          </a:p>
-        </p:txBody>
-      </p:sp>
-      <p:sp>
-        <p:nvSpPr>
-          <p:cNvPr id="3" name="Content Placeholder 2"/>
-          <p:cNvSpPr>
-            <a:spLocks noGrp="1"/>
-          </p:cNvSpPr>
-          <p:nvPr>
-            <p:ph idx="1"/>
-          </p:nvPr>
-        </p:nvSpPr>
-        <p:spPr/>
-        <p:txBody>
           <a:bodyPr/>
           <a:lstStyle/>
           <a:p>
             <a:r>
               <a:rPr lang="en-US" dirty="0" smtClean="0"/>
-              <a:t>Create Connection</a:t>
-            </a:r>
-          </a:p>
+              <a:t>Project Overview</a:t>
+            </a:r>
+            <a:endParaRPr lang="en-US" dirty="0"/>
+          </a:p>
+        </p:txBody>
+      </p:sp>
+      <p:sp>
+        <p:nvSpPr>
+          <p:cNvPr id="3" name="Content Placeholder 2"/>
+          <p:cNvSpPr>
+            <a:spLocks noGrp="1"/>
+          </p:cNvSpPr>
+          <p:nvPr>
+            <p:ph idx="1"/>
+          </p:nvPr>
+        </p:nvSpPr>
+        <p:spPr/>
+        <p:txBody>
+          <a:bodyPr/>
+          <a:lstStyle/>
           <a:p>
             <a:r>
               <a:rPr lang="en-US" dirty="0" smtClean="0"/>
-              <a:t>Edit Connection</a:t>
-            </a:r>
+              <a:t>Connect to a database</a:t>
+            </a:r>
+          </a:p>
+          <a:p>
+            <a:pPr>
+              <a:buNone/>
+            </a:pPr>
+            <a:endParaRPr lang="en-US" dirty="0" smtClean="0"/>
           </a:p>
           <a:p>
             <a:r>
               <a:rPr lang="en-US" dirty="0" smtClean="0"/>
-              <a:t>Delete Connection</a:t>
-            </a:r>
-          </a:p>
-          <a:p>
+              <a:t>Map database field(s) to KML field(s)</a:t>
+            </a:r>
+          </a:p>
+          <a:p>
+            <a:pPr lvl="1"/>
             <a:r>
               <a:rPr lang="en-US" dirty="0" smtClean="0"/>
-              <a:t>Generate KML File</a:t>
+              <a:t>Latitude/Longitude</a:t>
             </a:r>
           </a:p>
           <a:p>
             <a:pPr lvl="1"/>
             <a:r>
+              <a:rPr lang="en-US" dirty="0" err="1" smtClean="0"/>
+              <a:t>Placemark</a:t>
+            </a:r>
+            <a:r>
               <a:rPr lang="en-US" dirty="0" smtClean="0"/>
-              <a:t>Web Service</a:t>
+              <a:t> Name</a:t>
             </a:r>
           </a:p>
           <a:p>
             <a:pPr lvl="1"/>
             <a:r>
               <a:rPr lang="en-US" dirty="0" smtClean="0"/>
-              <a:t>Web Application</a:t>
-            </a:r>
+              <a:t>Insert Field Values into Description</a:t>
+            </a:r>
+          </a:p>
+          <a:p>
+            <a:pPr lvl="1">
+              <a:buNone/>
+            </a:pPr>
+            <a:endParaRPr lang="en-US" dirty="0" smtClean="0"/>
           </a:p>
           <a:p>
             <a:r>
               <a:rPr lang="en-US" dirty="0" smtClean="0"/>
-              <a:t>Preview KML </a:t>
-            </a:r>
-            <a:r>
-              <a:rPr lang="en-US" dirty="0" smtClean="0"/>
-              <a:t>in browser by Google Earth </a:t>
-            </a:r>
-            <a:r>
-              <a:rPr lang="en-US" dirty="0" err="1" smtClean="0"/>
-              <a:t>Plugin</a:t>
-            </a:r>
-            <a:endParaRPr lang="en-US" dirty="0"/>
-          </a:p>
-        </p:txBody>
-      </p:sp>
+              <a:t>Generate KML</a:t>
+            </a:r>
+          </a:p>
+          <a:p>
+            <a:pPr lvl="1"/>
+            <a:endParaRPr lang="en-US" dirty="0" smtClean="0"/>
+          </a:p>
+        </p:txBody>
+      </p:sp>
+      <p:pic>
+        <p:nvPicPr>
+          <p:cNvPr id="4" name="Picture 2" descr="C:\Users\nindoja\Desktop\odbc2kml\hci\HCI\graphics\odbc2kml.gif"/>
+          <p:cNvPicPr>
+            <a:picLocks noChangeAspect="1" noChangeArrowheads="1"/>
+          </p:cNvPicPr>
+          <p:nvPr/>
+        </p:nvPicPr>
+        <p:blipFill>
+          <a:blip r:embed="rId2" cstate="print"/>
+          <a:srcRect/>
+          <a:stretch>
+            <a:fillRect/>
+          </a:stretch>
+        </p:blipFill>
+        <p:spPr bwMode="auto">
+          <a:xfrm>
+            <a:off x="5029200" y="6319615"/>
+            <a:ext cx="4114800" cy="538385"/>
+          </a:xfrm>
+          <a:prstGeom prst="rect">
+            <a:avLst/>
+          </a:prstGeom>
+          <a:noFill/>
+        </p:spPr>
+      </p:pic>
     </p:spTree>
   </p:cSld>
   <p:clrMapOvr>

</xml_diff>